<commit_message>
revise bank conflict illustration
</commit_message>
<xml_diff>
--- a/docs/presentation.pptx
+++ b/docs/presentation.pptx
@@ -5,7 +5,7 @@
     <p:sldMasterId id="2147483648" r:id="rId1"/>
   </p:sldMasterIdLst>
   <p:notesMasterIdLst>
-    <p:notesMasterId r:id="rId51"/>
+    <p:notesMasterId r:id="rId52"/>
   </p:notesMasterIdLst>
   <p:sldIdLst>
     <p:sldId id="256" r:id="rId2"/>
@@ -38,25 +38,26 @@
     <p:sldId id="291" r:id="rId29"/>
     <p:sldId id="292" r:id="rId30"/>
     <p:sldId id="293" r:id="rId31"/>
-    <p:sldId id="294" r:id="rId32"/>
-    <p:sldId id="295" r:id="rId33"/>
-    <p:sldId id="296" r:id="rId34"/>
-    <p:sldId id="297" r:id="rId35"/>
-    <p:sldId id="298" r:id="rId36"/>
-    <p:sldId id="299" r:id="rId37"/>
-    <p:sldId id="300" r:id="rId38"/>
-    <p:sldId id="301" r:id="rId39"/>
-    <p:sldId id="302" r:id="rId40"/>
-    <p:sldId id="304" r:id="rId41"/>
-    <p:sldId id="303" r:id="rId42"/>
-    <p:sldId id="305" r:id="rId43"/>
-    <p:sldId id="306" r:id="rId44"/>
-    <p:sldId id="281" r:id="rId45"/>
-    <p:sldId id="307" r:id="rId46"/>
-    <p:sldId id="285" r:id="rId47"/>
-    <p:sldId id="286" r:id="rId48"/>
-    <p:sldId id="287" r:id="rId49"/>
-    <p:sldId id="308" r:id="rId50"/>
+    <p:sldId id="309" r:id="rId32"/>
+    <p:sldId id="294" r:id="rId33"/>
+    <p:sldId id="295" r:id="rId34"/>
+    <p:sldId id="296" r:id="rId35"/>
+    <p:sldId id="297" r:id="rId36"/>
+    <p:sldId id="298" r:id="rId37"/>
+    <p:sldId id="299" r:id="rId38"/>
+    <p:sldId id="300" r:id="rId39"/>
+    <p:sldId id="301" r:id="rId40"/>
+    <p:sldId id="302" r:id="rId41"/>
+    <p:sldId id="304" r:id="rId42"/>
+    <p:sldId id="303" r:id="rId43"/>
+    <p:sldId id="305" r:id="rId44"/>
+    <p:sldId id="306" r:id="rId45"/>
+    <p:sldId id="281" r:id="rId46"/>
+    <p:sldId id="307" r:id="rId47"/>
+    <p:sldId id="285" r:id="rId48"/>
+    <p:sldId id="286" r:id="rId49"/>
+    <p:sldId id="287" r:id="rId50"/>
+    <p:sldId id="308" r:id="rId51"/>
   </p:sldIdLst>
   <p:sldSz cx="12192000" cy="6858000"/>
   <p:notesSz cx="6858000" cy="9144000"/>
@@ -245,7 +246,7 @@
           <a:p>
             <a:fld id="{E47CBBF2-89D6-47D7-BD4F-12FF88AD8D84}" type="datetimeFigureOut">
               <a:rPr lang="zh-CN" altLang="en-US" smtClean="0"/>
-              <a:t>2025/3/9</a:t>
+              <a:t>2025/3/10</a:t>
             </a:fld>
             <a:endParaRPr lang="zh-CN" altLang="en-US"/>
           </a:p>
@@ -581,7 +582,7 @@
           <a:p>
             <a:fld id="{9AC5B61F-A5F0-4C64-8ED9-3ED35B2F1A5C}" type="slidenum">
               <a:rPr lang="zh-CN" altLang="en-US" smtClean="0"/>
-              <a:t>39</a:t>
+              <a:t>40</a:t>
             </a:fld>
             <a:endParaRPr lang="zh-CN" altLang="en-US"/>
           </a:p>
@@ -644,10 +645,6 @@
           <a:bodyPr/>
           <a:lstStyle/>
           <a:p>
-            <a:r>
-              <a:rPr lang="en-US" altLang="zh-CN" dirty="0"/>
-              <a:t>The 23rd slide shows the possible optimization.</a:t>
-            </a:r>
             <a:endParaRPr lang="zh-CN" altLang="en-US" dirty="0"/>
           </a:p>
         </p:txBody>
@@ -716,7 +713,7 @@
                 <a:tabLst/>
                 <a:defRPr/>
               </a:pPr>
-              <a:t>40</a:t>
+              <a:t>41</a:t>
             </a:fld>
             <a:endParaRPr kumimoji="0" lang="zh-CN" altLang="en-US" sz="1200" b="0" i="0" u="none" strike="noStrike" kern="1200" cap="none" spc="0" normalizeH="0" baseline="0" noProof="0">
               <a:ln>
@@ -895,7 +892,7 @@
           <a:p>
             <a:fld id="{ACDF5B7E-8B04-42BE-867D-2CCC28031EE2}" type="datetimeFigureOut">
               <a:rPr lang="zh-CN" altLang="en-US" smtClean="0"/>
-              <a:t>2025/3/9</a:t>
+              <a:t>2025/3/10</a:t>
             </a:fld>
             <a:endParaRPr lang="zh-CN" altLang="en-US"/>
           </a:p>
@@ -1093,7 +1090,7 @@
           <a:p>
             <a:fld id="{ACDF5B7E-8B04-42BE-867D-2CCC28031EE2}" type="datetimeFigureOut">
               <a:rPr lang="zh-CN" altLang="en-US" smtClean="0"/>
-              <a:t>2025/3/9</a:t>
+              <a:t>2025/3/10</a:t>
             </a:fld>
             <a:endParaRPr lang="zh-CN" altLang="en-US"/>
           </a:p>
@@ -1301,7 +1298,7 @@
           <a:p>
             <a:fld id="{ACDF5B7E-8B04-42BE-867D-2CCC28031EE2}" type="datetimeFigureOut">
               <a:rPr lang="zh-CN" altLang="en-US" smtClean="0"/>
-              <a:t>2025/3/9</a:t>
+              <a:t>2025/3/10</a:t>
             </a:fld>
             <a:endParaRPr lang="zh-CN" altLang="en-US"/>
           </a:p>
@@ -1499,7 +1496,7 @@
           <a:p>
             <a:fld id="{ACDF5B7E-8B04-42BE-867D-2CCC28031EE2}" type="datetimeFigureOut">
               <a:rPr lang="zh-CN" altLang="en-US" smtClean="0"/>
-              <a:t>2025/3/9</a:t>
+              <a:t>2025/3/10</a:t>
             </a:fld>
             <a:endParaRPr lang="zh-CN" altLang="en-US"/>
           </a:p>
@@ -1774,7 +1771,7 @@
           <a:p>
             <a:fld id="{ACDF5B7E-8B04-42BE-867D-2CCC28031EE2}" type="datetimeFigureOut">
               <a:rPr lang="zh-CN" altLang="en-US" smtClean="0"/>
-              <a:t>2025/3/9</a:t>
+              <a:t>2025/3/10</a:t>
             </a:fld>
             <a:endParaRPr lang="zh-CN" altLang="en-US"/>
           </a:p>
@@ -2039,7 +2036,7 @@
           <a:p>
             <a:fld id="{ACDF5B7E-8B04-42BE-867D-2CCC28031EE2}" type="datetimeFigureOut">
               <a:rPr lang="zh-CN" altLang="en-US" smtClean="0"/>
-              <a:t>2025/3/9</a:t>
+              <a:t>2025/3/10</a:t>
             </a:fld>
             <a:endParaRPr lang="zh-CN" altLang="en-US"/>
           </a:p>
@@ -2451,7 +2448,7 @@
           <a:p>
             <a:fld id="{ACDF5B7E-8B04-42BE-867D-2CCC28031EE2}" type="datetimeFigureOut">
               <a:rPr lang="zh-CN" altLang="en-US" smtClean="0"/>
-              <a:t>2025/3/9</a:t>
+              <a:t>2025/3/10</a:t>
             </a:fld>
             <a:endParaRPr lang="zh-CN" altLang="en-US"/>
           </a:p>
@@ -2592,7 +2589,7 @@
           <a:p>
             <a:fld id="{ACDF5B7E-8B04-42BE-867D-2CCC28031EE2}" type="datetimeFigureOut">
               <a:rPr lang="zh-CN" altLang="en-US" smtClean="0"/>
-              <a:t>2025/3/9</a:t>
+              <a:t>2025/3/10</a:t>
             </a:fld>
             <a:endParaRPr lang="zh-CN" altLang="en-US"/>
           </a:p>
@@ -2705,7 +2702,7 @@
           <a:p>
             <a:fld id="{ACDF5B7E-8B04-42BE-867D-2CCC28031EE2}" type="datetimeFigureOut">
               <a:rPr lang="zh-CN" altLang="en-US" smtClean="0"/>
-              <a:t>2025/3/9</a:t>
+              <a:t>2025/3/10</a:t>
             </a:fld>
             <a:endParaRPr lang="zh-CN" altLang="en-US"/>
           </a:p>
@@ -3016,7 +3013,7 @@
           <a:p>
             <a:fld id="{ACDF5B7E-8B04-42BE-867D-2CCC28031EE2}" type="datetimeFigureOut">
               <a:rPr lang="zh-CN" altLang="en-US" smtClean="0"/>
-              <a:t>2025/3/9</a:t>
+              <a:t>2025/3/10</a:t>
             </a:fld>
             <a:endParaRPr lang="zh-CN" altLang="en-US"/>
           </a:p>
@@ -3304,7 +3301,7 @@
           <a:p>
             <a:fld id="{ACDF5B7E-8B04-42BE-867D-2CCC28031EE2}" type="datetimeFigureOut">
               <a:rPr lang="zh-CN" altLang="en-US" smtClean="0"/>
-              <a:t>2025/3/9</a:t>
+              <a:t>2025/3/10</a:t>
             </a:fld>
             <a:endParaRPr lang="zh-CN" altLang="en-US"/>
           </a:p>
@@ -3545,7 +3542,7 @@
           <a:p>
             <a:fld id="{ACDF5B7E-8B04-42BE-867D-2CCC28031EE2}" type="datetimeFigureOut">
               <a:rPr lang="zh-CN" altLang="en-US" smtClean="0"/>
-              <a:t>2025/3/9</a:t>
+              <a:t>2025/3/10</a:t>
             </a:fld>
             <a:endParaRPr lang="zh-CN" altLang="en-US"/>
           </a:p>
@@ -4768,8 +4765,8 @@
         </p:nvSpPr>
         <p:spPr>
           <a:xfrm>
-            <a:off x="1638556" y="2460902"/>
-            <a:ext cx="10058400" cy="1508105"/>
+            <a:off x="1607872" y="2945719"/>
+            <a:ext cx="9622678" cy="1508105"/>
           </a:xfrm>
           <a:prstGeom prst="rect">
             <a:avLst/>
@@ -6370,7 +6367,7 @@
         </p:blipFill>
         <p:spPr>
           <a:xfrm>
-            <a:off x="1124064" y="3130359"/>
+            <a:off x="829493" y="3259769"/>
             <a:ext cx="10717121" cy="1971950"/>
           </a:xfrm>
           <a:prstGeom prst="rect">
@@ -7821,7 +7818,7 @@
           <p:cNvPr id="2" name="文本框 1">
             <a:extLst>
               <a:ext uri="{FF2B5EF4-FFF2-40B4-BE49-F238E27FC236}">
-                <a16:creationId xmlns:a16="http://schemas.microsoft.com/office/drawing/2014/main" id="{E1A1155F-45DD-1F11-B6A6-360E59DF9906}"/>
+                <a16:creationId xmlns:a16="http://schemas.microsoft.com/office/drawing/2014/main" id="{3025D05C-255D-0175-7202-1592F7632084}"/>
               </a:ext>
             </a:extLst>
           </p:cNvPr>
@@ -7857,12 +7854,125 @@
           </a:p>
         </p:txBody>
       </p:sp>
+      <p:sp>
+        <p:nvSpPr>
+          <p:cNvPr id="12" name="文本框 11">
+            <a:extLst>
+              <a:ext uri="{FF2B5EF4-FFF2-40B4-BE49-F238E27FC236}">
+                <a16:creationId xmlns:a16="http://schemas.microsoft.com/office/drawing/2014/main" id="{0AC89F59-FDA7-22D4-8B8D-F3CDC56D0A8C}"/>
+              </a:ext>
+            </a:extLst>
+          </p:cNvPr>
+          <p:cNvSpPr txBox="1"/>
+          <p:nvPr/>
+        </p:nvSpPr>
+        <p:spPr>
+          <a:xfrm>
+            <a:off x="714020" y="1807573"/>
+            <a:ext cx="2345323" cy="1323439"/>
+          </a:xfrm>
+          <a:prstGeom prst="rect">
+            <a:avLst/>
+          </a:prstGeom>
+          <a:noFill/>
+        </p:spPr>
+        <p:txBody>
+          <a:bodyPr wrap="square">
+            <a:spAutoFit/>
+          </a:bodyPr>
+          <a:lstStyle/>
+          <a:p>
+            <a:pPr marL="0" marR="0" lvl="0" indent="0" algn="l" defTabSz="914400" rtl="0" eaLnBrk="1" fontAlgn="auto" latinLnBrk="0" hangingPunct="1">
+              <a:lnSpc>
+                <a:spcPct val="100000"/>
+              </a:lnSpc>
+              <a:spcBef>
+                <a:spcPts val="0"/>
+              </a:spcBef>
+              <a:spcAft>
+                <a:spcPts val="0"/>
+              </a:spcAft>
+              <a:buClrTx/>
+              <a:buSzTx/>
+              <a:buFontTx/>
+              <a:buNone/>
+              <a:tabLst/>
+              <a:defRPr/>
+            </a:pPr>
+            <a:r>
+              <a:rPr kumimoji="0" lang="en-US" altLang="zh-CN" sz="2000" b="1" i="0" u="none" strike="noStrike" kern="1200" cap="none" spc="0" normalizeH="0" baseline="0" noProof="0" dirty="0">
+                <a:ln>
+                  <a:noFill/>
+                </a:ln>
+                <a:solidFill>
+                  <a:prstClr val="black"/>
+                </a:solidFill>
+                <a:effectLst/>
+                <a:uLnTx/>
+                <a:uFillTx/>
+                <a:latin typeface="等线" panose="020F0502020204030204"/>
+                <a:ea typeface="等线" panose="02010600030101010101" pitchFamily="2" charset="-122"/>
+                <a:cs typeface="+mn-cs"/>
+              </a:rPr>
+              <a:t>How threads within a warp load into A_TILE </a:t>
+            </a:r>
+            <a:r>
+              <a:rPr kumimoji="0" lang="en-US" altLang="zh-CN" sz="2000" b="1" i="0" u="none" strike="noStrike" kern="1200" cap="none" spc="0" normalizeH="0" baseline="0" noProof="0" dirty="0" err="1">
+                <a:ln>
+                  <a:noFill/>
+                </a:ln>
+                <a:solidFill>
+                  <a:prstClr val="black"/>
+                </a:solidFill>
+                <a:effectLst/>
+                <a:uLnTx/>
+                <a:uFillTx/>
+                <a:latin typeface="等线" panose="020F0502020204030204"/>
+                <a:ea typeface="等线" panose="02010600030101010101" pitchFamily="2" charset="-122"/>
+                <a:cs typeface="+mn-cs"/>
+              </a:rPr>
+              <a:t>smem</a:t>
+            </a:r>
+            <a:r>
+              <a:rPr kumimoji="0" lang="en-US" altLang="zh-CN" sz="2000" b="1" i="0" u="none" strike="noStrike" kern="1200" cap="none" spc="0" normalizeH="0" baseline="0" noProof="0" dirty="0">
+                <a:ln>
+                  <a:noFill/>
+                </a:ln>
+                <a:solidFill>
+                  <a:prstClr val="black"/>
+                </a:solidFill>
+                <a:effectLst/>
+                <a:uLnTx/>
+                <a:uFillTx/>
+                <a:latin typeface="等线" panose="020F0502020204030204"/>
+                <a:ea typeface="等线" panose="02010600030101010101" pitchFamily="2" charset="-122"/>
+                <a:cs typeface="+mn-cs"/>
+              </a:rPr>
+              <a:t> from global mem:</a:t>
+            </a:r>
+            <a:endParaRPr kumimoji="0" lang="zh-CN" altLang="en-US" sz="2000" b="1" i="0" u="none" strike="noStrike" kern="1200" cap="none" spc="0" normalizeH="0" baseline="0" noProof="0" dirty="0">
+              <a:ln>
+                <a:noFill/>
+              </a:ln>
+              <a:solidFill>
+                <a:prstClr val="black"/>
+              </a:solidFill>
+              <a:effectLst/>
+              <a:uLnTx/>
+              <a:uFillTx/>
+              <a:latin typeface="等线" panose="020F0502020204030204"/>
+              <a:ea typeface="等线" panose="02010600030101010101" pitchFamily="2" charset="-122"/>
+              <a:cs typeface="+mn-cs"/>
+            </a:endParaRPr>
+          </a:p>
+        </p:txBody>
+      </p:sp>
       <p:pic>
         <p:nvPicPr>
-          <p:cNvPr id="4" name="图片 3">
-            <a:extLst>
-              <a:ext uri="{FF2B5EF4-FFF2-40B4-BE49-F238E27FC236}">
-                <a16:creationId xmlns:a16="http://schemas.microsoft.com/office/drawing/2014/main" id="{B1454803-8E08-3706-29D9-077EAD3117AE}"/>
+          <p:cNvPr id="16" name="图片 15">
+            <a:extLst>
+              <a:ext uri="{FF2B5EF4-FFF2-40B4-BE49-F238E27FC236}">
+                <a16:creationId xmlns:a16="http://schemas.microsoft.com/office/drawing/2014/main" id="{F807CD08-B3CA-AE28-DB7A-996364728D22}"/>
               </a:ext>
             </a:extLst>
           </p:cNvPr>
@@ -7879,20 +7989,68 @@
         </p:blipFill>
         <p:spPr>
           <a:xfrm>
-            <a:off x="364571" y="1515818"/>
-            <a:ext cx="5386801" cy="4579622"/>
+            <a:off x="4892561" y="1012689"/>
+            <a:ext cx="2962688" cy="5458587"/>
           </a:xfrm>
           <a:prstGeom prst="rect">
             <a:avLst/>
           </a:prstGeom>
         </p:spPr>
       </p:pic>
+      <p:sp>
+        <p:nvSpPr>
+          <p:cNvPr id="17" name="文本框 16">
+            <a:extLst>
+              <a:ext uri="{FF2B5EF4-FFF2-40B4-BE49-F238E27FC236}">
+                <a16:creationId xmlns:a16="http://schemas.microsoft.com/office/drawing/2014/main" id="{6E8C8347-FA16-7902-5D85-02A1607B53AD}"/>
+              </a:ext>
+            </a:extLst>
+          </p:cNvPr>
+          <p:cNvSpPr txBox="1"/>
+          <p:nvPr/>
+        </p:nvSpPr>
+        <p:spPr>
+          <a:xfrm>
+            <a:off x="8790013" y="3034096"/>
+            <a:ext cx="2687967" cy="707886"/>
+          </a:xfrm>
+          <a:prstGeom prst="rect">
+            <a:avLst/>
+          </a:prstGeom>
+          <a:noFill/>
+        </p:spPr>
+        <p:txBody>
+          <a:bodyPr wrap="square" rtlCol="0">
+            <a:spAutoFit/>
+          </a:bodyPr>
+          <a:lstStyle/>
+          <a:p>
+            <a:r>
+              <a:rPr lang="en-US" altLang="zh-CN" sz="2000" b="1" dirty="0">
+                <a:solidFill>
+                  <a:prstClr val="black"/>
+                </a:solidFill>
+                <a:latin typeface="等线" panose="020F0502020204030204"/>
+                <a:ea typeface="等线" panose="02010600030101010101" pitchFamily="2" charset="-122"/>
+              </a:rPr>
+              <a:t>A 2-way bank conflict happens here.</a:t>
+            </a:r>
+            <a:endParaRPr lang="zh-CN" altLang="en-US" sz="2000" b="1" dirty="0">
+              <a:solidFill>
+                <a:prstClr val="black"/>
+              </a:solidFill>
+              <a:latin typeface="等线" panose="020F0502020204030204"/>
+              <a:ea typeface="等线" panose="02010600030101010101" pitchFamily="2" charset="-122"/>
+            </a:endParaRPr>
+          </a:p>
+        </p:txBody>
+      </p:sp>
       <p:pic>
         <p:nvPicPr>
-          <p:cNvPr id="6" name="图片 5">
-            <a:extLst>
-              <a:ext uri="{FF2B5EF4-FFF2-40B4-BE49-F238E27FC236}">
-                <a16:creationId xmlns:a16="http://schemas.microsoft.com/office/drawing/2014/main" id="{8EDC8577-AFAC-5797-77FC-22F3B2B3E3F9}"/>
+          <p:cNvPr id="19" name="图片 18">
+            <a:extLst>
+              <a:ext uri="{FF2B5EF4-FFF2-40B4-BE49-F238E27FC236}">
+                <a16:creationId xmlns:a16="http://schemas.microsoft.com/office/drawing/2014/main" id="{D42A760D-3618-5E1A-F10B-B5C10CCA4E06}"/>
               </a:ext>
             </a:extLst>
           </p:cNvPr>
@@ -7909,8 +8067,8 @@
         </p:blipFill>
         <p:spPr>
           <a:xfrm>
-            <a:off x="5906421" y="1313298"/>
-            <a:ext cx="5994651" cy="4691670"/>
+            <a:off x="280327" y="4231818"/>
+            <a:ext cx="3972479" cy="885949"/>
           </a:xfrm>
           <a:prstGeom prst="rect">
             <a:avLst/>
@@ -7920,7 +8078,7 @@
     </p:spTree>
     <p:extLst>
       <p:ext uri="{BB962C8B-B14F-4D97-AF65-F5344CB8AC3E}">
-        <p14:creationId xmlns:p14="http://schemas.microsoft.com/office/powerpoint/2010/main" val="4234656505"/>
+        <p14:creationId xmlns:p14="http://schemas.microsoft.com/office/powerpoint/2010/main" val="1310816782"/>
       </p:ext>
     </p:extLst>
   </p:cSld>
@@ -7952,7 +8110,7 @@
           <p:cNvPr id="2" name="文本框 1">
             <a:extLst>
               <a:ext uri="{FF2B5EF4-FFF2-40B4-BE49-F238E27FC236}">
-                <a16:creationId xmlns:a16="http://schemas.microsoft.com/office/drawing/2014/main" id="{ADDEF014-86BF-A3CE-1959-38E81315CCA1}"/>
+                <a16:creationId xmlns:a16="http://schemas.microsoft.com/office/drawing/2014/main" id="{E1A1155F-45DD-1F11-B6A6-360E59DF9906}"/>
               </a:ext>
             </a:extLst>
           </p:cNvPr>
@@ -7990,10 +8148,10 @@
       </p:sp>
       <p:sp>
         <p:nvSpPr>
-          <p:cNvPr id="3" name="文本框 2">
-            <a:extLst>
-              <a:ext uri="{FF2B5EF4-FFF2-40B4-BE49-F238E27FC236}">
-                <a16:creationId xmlns:a16="http://schemas.microsoft.com/office/drawing/2014/main" id="{3EE0E1D4-5CFC-B592-AE06-24A28E54F376}"/>
+          <p:cNvPr id="7" name="文本框 6">
+            <a:extLst>
+              <a:ext uri="{FF2B5EF4-FFF2-40B4-BE49-F238E27FC236}">
+                <a16:creationId xmlns:a16="http://schemas.microsoft.com/office/drawing/2014/main" id="{396FC7EF-E11D-978B-3CFB-4043797CEA79}"/>
               </a:ext>
             </a:extLst>
           </p:cNvPr>
@@ -8002,8 +8160,8 @@
         </p:nvSpPr>
         <p:spPr>
           <a:xfrm>
-            <a:off x="1350121" y="2595914"/>
-            <a:ext cx="10074765" cy="1938992"/>
+            <a:off x="1485132" y="998872"/>
+            <a:ext cx="8646910" cy="400110"/>
           </a:xfrm>
           <a:prstGeom prst="rect">
             <a:avLst/>
@@ -8017,32 +8175,121 @@
           <a:lstStyle/>
           <a:p>
             <a:r>
-              <a:rPr lang="en-US" altLang="zh-CN" sz="2400" b="1" dirty="0"/>
-              <a:t>In fact, the shared memory access pattern is even worse for B, </a:t>
-            </a:r>
-          </a:p>
-          <a:p>
-            <a:r>
-              <a:rPr lang="en-US" altLang="zh-CN" sz="2400" b="1" dirty="0"/>
-              <a:t>which results in a 4-way conflict.</a:t>
-            </a:r>
-          </a:p>
-          <a:p>
-            <a:endParaRPr lang="en-US" altLang="zh-CN" sz="2400" b="1" dirty="0"/>
-          </a:p>
-          <a:p>
-            <a:r>
-              <a:rPr lang="en-US" altLang="zh-CN" sz="2400" b="1" dirty="0"/>
-              <a:t>Before thinking how to resolve bank conflict, let me check another problem, uncoalesced global store.</a:t>
-            </a:r>
-            <a:endParaRPr lang="zh-CN" altLang="en-US" sz="2400" b="1" dirty="0"/>
-          </a:p>
-        </p:txBody>
-      </p:sp>
+              <a:rPr lang="en-US" altLang="zh-CN" sz="2000" b="1" dirty="0"/>
+              <a:t>How threads within a warp load into B_TILE </a:t>
+            </a:r>
+            <a:r>
+              <a:rPr lang="en-US" altLang="zh-CN" sz="2000" b="1" dirty="0" err="1"/>
+              <a:t>smem</a:t>
+            </a:r>
+            <a:r>
+              <a:rPr lang="en-US" altLang="zh-CN" sz="2000" b="1" dirty="0"/>
+              <a:t> from global mem:</a:t>
+            </a:r>
+            <a:endParaRPr lang="zh-CN" altLang="en-US" sz="2000" b="1" dirty="0"/>
+          </a:p>
+        </p:txBody>
+      </p:sp>
+      <p:sp>
+        <p:nvSpPr>
+          <p:cNvPr id="8" name="文本框 7">
+            <a:extLst>
+              <a:ext uri="{FF2B5EF4-FFF2-40B4-BE49-F238E27FC236}">
+                <a16:creationId xmlns:a16="http://schemas.microsoft.com/office/drawing/2014/main" id="{9470E520-3511-E7C5-0792-EE1DFC69B401}"/>
+              </a:ext>
+            </a:extLst>
+          </p:cNvPr>
+          <p:cNvSpPr txBox="1"/>
+          <p:nvPr/>
+        </p:nvSpPr>
+        <p:spPr>
+          <a:xfrm>
+            <a:off x="3519518" y="5842342"/>
+            <a:ext cx="4418577" cy="400110"/>
+          </a:xfrm>
+          <a:prstGeom prst="rect">
+            <a:avLst/>
+          </a:prstGeom>
+          <a:noFill/>
+        </p:spPr>
+        <p:txBody>
+          <a:bodyPr wrap="square" rtlCol="0">
+            <a:spAutoFit/>
+          </a:bodyPr>
+          <a:lstStyle/>
+          <a:p>
+            <a:r>
+              <a:rPr lang="en-US" altLang="zh-CN" sz="2000" b="1" dirty="0"/>
+              <a:t>A 4-way bank conflict happens here.</a:t>
+            </a:r>
+            <a:endParaRPr lang="zh-CN" altLang="en-US" sz="2000" b="1" dirty="0"/>
+          </a:p>
+        </p:txBody>
+      </p:sp>
+      <p:pic>
+        <p:nvPicPr>
+          <p:cNvPr id="10" name="图片 9">
+            <a:extLst>
+              <a:ext uri="{FF2B5EF4-FFF2-40B4-BE49-F238E27FC236}">
+                <a16:creationId xmlns:a16="http://schemas.microsoft.com/office/drawing/2014/main" id="{46240628-B837-655B-785D-5A9B4D4A3EFD}"/>
+              </a:ext>
+            </a:extLst>
+          </p:cNvPr>
+          <p:cNvPicPr>
+            <a:picLocks noChangeAspect="1"/>
+          </p:cNvPicPr>
+          <p:nvPr/>
+        </p:nvPicPr>
+        <p:blipFill>
+          <a:blip r:embed="rId2"/>
+          <a:stretch>
+            <a:fillRect/>
+          </a:stretch>
+        </p:blipFill>
+        <p:spPr>
+          <a:xfrm>
+            <a:off x="699334" y="1914920"/>
+            <a:ext cx="10793331" cy="209579"/>
+          </a:xfrm>
+          <a:prstGeom prst="rect">
+            <a:avLst/>
+          </a:prstGeom>
+        </p:spPr>
+      </p:pic>
+      <p:pic>
+        <p:nvPicPr>
+          <p:cNvPr id="12" name="图片 11">
+            <a:extLst>
+              <a:ext uri="{FF2B5EF4-FFF2-40B4-BE49-F238E27FC236}">
+                <a16:creationId xmlns:a16="http://schemas.microsoft.com/office/drawing/2014/main" id="{C3C70BE2-521F-A8D5-8CA2-3EF188FDDF92}"/>
+              </a:ext>
+            </a:extLst>
+          </p:cNvPr>
+          <p:cNvPicPr>
+            <a:picLocks noChangeAspect="1"/>
+          </p:cNvPicPr>
+          <p:nvPr/>
+        </p:nvPicPr>
+        <p:blipFill>
+          <a:blip r:embed="rId3"/>
+          <a:stretch>
+            <a:fillRect/>
+          </a:stretch>
+        </p:blipFill>
+        <p:spPr>
+          <a:xfrm>
+            <a:off x="699334" y="3200614"/>
+            <a:ext cx="11234642" cy="1190693"/>
+          </a:xfrm>
+          <a:prstGeom prst="rect">
+            <a:avLst/>
+          </a:prstGeom>
+        </p:spPr>
+      </p:pic>
     </p:spTree>
     <p:extLst>
       <p:ext uri="{BB962C8B-B14F-4D97-AF65-F5344CB8AC3E}">
-        <p14:creationId xmlns:p14="http://schemas.microsoft.com/office/powerpoint/2010/main" val="1857582931"/>
+        <p14:creationId xmlns:p14="http://schemas.microsoft.com/office/powerpoint/2010/main" val="4234656505"/>
       </p:ext>
     </p:extLst>
   </p:cSld>
@@ -8074,7 +8321,7 @@
           <p:cNvPr id="2" name="文本框 1">
             <a:extLst>
               <a:ext uri="{FF2B5EF4-FFF2-40B4-BE49-F238E27FC236}">
-                <a16:creationId xmlns:a16="http://schemas.microsoft.com/office/drawing/2014/main" id="{12C1AB39-C40A-965E-9B72-EC75E0CCE14F}"/>
+                <a16:creationId xmlns:a16="http://schemas.microsoft.com/office/drawing/2014/main" id="{ADDEF014-86BF-A3CE-1959-38E81315CCA1}"/>
               </a:ext>
             </a:extLst>
           </p:cNvPr>
@@ -8112,10 +8359,10 @@
       </p:sp>
       <p:sp>
         <p:nvSpPr>
-          <p:cNvPr id="6" name="文本框 5">
-            <a:extLst>
-              <a:ext uri="{FF2B5EF4-FFF2-40B4-BE49-F238E27FC236}">
-                <a16:creationId xmlns:a16="http://schemas.microsoft.com/office/drawing/2014/main" id="{C9F3A5F3-E08E-DA30-7CFA-35DF8A31F300}"/>
+          <p:cNvPr id="3" name="文本框 2">
+            <a:extLst>
+              <a:ext uri="{FF2B5EF4-FFF2-40B4-BE49-F238E27FC236}">
+                <a16:creationId xmlns:a16="http://schemas.microsoft.com/office/drawing/2014/main" id="{3EE0E1D4-5CFC-B592-AE06-24A28E54F376}"/>
               </a:ext>
             </a:extLst>
           </p:cNvPr>
@@ -8124,8 +8371,8 @@
         </p:nvSpPr>
         <p:spPr>
           <a:xfrm>
-            <a:off x="1804252" y="2295620"/>
-            <a:ext cx="9291286" cy="1754326"/>
+            <a:off x="1276478" y="2743200"/>
+            <a:ext cx="10074765" cy="830997"/>
           </a:xfrm>
           <a:prstGeom prst="rect">
             <a:avLst/>
@@ -8133,172 +8380,23 @@
           <a:noFill/>
         </p:spPr>
         <p:txBody>
-          <a:bodyPr wrap="square">
+          <a:bodyPr wrap="square" rtlCol="0">
             <a:spAutoFit/>
           </a:bodyPr>
           <a:lstStyle/>
           <a:p>
             <a:r>
-              <a:rPr lang="en-US" altLang="zh-CN" b="0" i="0" dirty="0">
-                <a:effectLst/>
-                <a:latin typeface="inherit"/>
-              </a:rPr>
-              <a:t>Each cache line in the GPU is dedicated by sectors</a:t>
-            </a:r>
-            <a:r>
-              <a:rPr lang="en-US" altLang="zh-CN" b="0" i="0" dirty="0">
-                <a:effectLst/>
-                <a:latin typeface="gg sans"/>
-              </a:rPr>
-              <a:t>, which are the smallest unit of memory </a:t>
-            </a:r>
-            <a:r>
-              <a:rPr lang="en-US" altLang="zh-CN" dirty="0">
-                <a:latin typeface="gg sans"/>
-              </a:rPr>
-              <a:t>that</a:t>
-            </a:r>
-            <a:r>
-              <a:rPr lang="en-US" altLang="zh-CN" b="0" i="0" dirty="0">
-                <a:effectLst/>
-                <a:latin typeface="gg sans"/>
-              </a:rPr>
-              <a:t> can </a:t>
-            </a:r>
-            <a:r>
-              <a:rPr lang="en-US" altLang="zh-CN" dirty="0">
-                <a:latin typeface="gg sans"/>
-              </a:rPr>
-              <a:t>be </a:t>
-            </a:r>
-            <a:r>
-              <a:rPr lang="en-US" altLang="zh-CN" b="0" i="0" dirty="0">
-                <a:effectLst/>
-                <a:latin typeface="gg sans"/>
-              </a:rPr>
-              <a:t>transferred into the cache</a:t>
-            </a:r>
-            <a:r>
-              <a:rPr lang="en-US" altLang="zh-CN" b="0" i="0" dirty="0">
-                <a:effectLst/>
-                <a:latin typeface="inherit"/>
-              </a:rPr>
-              <a:t>. What it is telling </a:t>
-            </a:r>
-            <a:r>
-              <a:rPr lang="en-US" altLang="zh-CN" dirty="0">
-                <a:latin typeface="inherit"/>
-              </a:rPr>
-              <a:t>me</a:t>
-            </a:r>
-            <a:r>
-              <a:rPr lang="en-US" altLang="zh-CN" b="0" i="0" dirty="0">
-                <a:effectLst/>
-                <a:latin typeface="inherit"/>
-              </a:rPr>
-              <a:t> is that out of the 32 bytes that need to be fetched to get a full sector</a:t>
-            </a:r>
-            <a:r>
-              <a:rPr lang="en-US" altLang="zh-CN" b="0" i="0" dirty="0">
-                <a:effectLst/>
-                <a:latin typeface="gg sans"/>
-              </a:rPr>
-              <a:t>, only 1 byte is read by </a:t>
-            </a:r>
-            <a:r>
-              <a:rPr lang="en-US" altLang="zh-CN" dirty="0">
-                <a:latin typeface="gg sans"/>
-              </a:rPr>
-              <a:t>my</a:t>
-            </a:r>
-            <a:r>
-              <a:rPr lang="en-US" altLang="zh-CN" b="0" i="0" dirty="0">
-                <a:effectLst/>
-                <a:latin typeface="gg sans"/>
-              </a:rPr>
-              <a:t> kernel, whereas the rest is just eating up cache space and bandwidth.</a:t>
-            </a:r>
-          </a:p>
-          <a:p>
-            <a:endParaRPr lang="en-US" altLang="zh-CN" dirty="0">
-              <a:latin typeface="gg sans"/>
-            </a:endParaRPr>
-          </a:p>
-          <a:p>
-            <a:r>
-              <a:rPr lang="en-US" altLang="zh-CN" dirty="0">
-                <a:latin typeface="gg sans"/>
-              </a:rPr>
-              <a:t>Remember that in kernel 7, each thread computes an 8 x 8 square submatrix of C. Why it is bad ?</a:t>
-            </a:r>
-            <a:endParaRPr lang="zh-CN" altLang="en-US" dirty="0"/>
-          </a:p>
-        </p:txBody>
-      </p:sp>
-      <p:pic>
-        <p:nvPicPr>
-          <p:cNvPr id="8" name="图片 7">
-            <a:extLst>
-              <a:ext uri="{FF2B5EF4-FFF2-40B4-BE49-F238E27FC236}">
-                <a16:creationId xmlns:a16="http://schemas.microsoft.com/office/drawing/2014/main" id="{A35AEF39-5AA9-CF51-0BA5-87AACB199F7F}"/>
-              </a:ext>
-            </a:extLst>
-          </p:cNvPr>
-          <p:cNvPicPr>
-            <a:picLocks noChangeAspect="1"/>
-          </p:cNvPicPr>
-          <p:nvPr/>
-        </p:nvPicPr>
-        <p:blipFill>
-          <a:blip r:embed="rId2"/>
-          <a:stretch>
-            <a:fillRect/>
-          </a:stretch>
-        </p:blipFill>
-        <p:spPr>
-          <a:xfrm>
-            <a:off x="144217" y="1210373"/>
-            <a:ext cx="11903565" cy="453802"/>
-          </a:xfrm>
-          <a:prstGeom prst="rect">
-            <a:avLst/>
-          </a:prstGeom>
-        </p:spPr>
-      </p:pic>
-      <p:pic>
-        <p:nvPicPr>
-          <p:cNvPr id="10" name="图片 9">
-            <a:extLst>
-              <a:ext uri="{FF2B5EF4-FFF2-40B4-BE49-F238E27FC236}">
-                <a16:creationId xmlns:a16="http://schemas.microsoft.com/office/drawing/2014/main" id="{8ADD4441-0A34-3918-D237-26ADD9AFB948}"/>
-              </a:ext>
-            </a:extLst>
-          </p:cNvPr>
-          <p:cNvPicPr>
-            <a:picLocks noChangeAspect="1"/>
-          </p:cNvPicPr>
-          <p:nvPr/>
-        </p:nvPicPr>
-        <p:blipFill>
-          <a:blip r:embed="rId3"/>
-          <a:stretch>
-            <a:fillRect/>
-          </a:stretch>
-        </p:blipFill>
-        <p:spPr>
-          <a:xfrm>
-            <a:off x="144216" y="4804446"/>
-            <a:ext cx="11903565" cy="1039562"/>
-          </a:xfrm>
-          <a:prstGeom prst="rect">
-            <a:avLst/>
-          </a:prstGeom>
-        </p:spPr>
-      </p:pic>
+              <a:rPr lang="en-US" altLang="zh-CN" sz="2400" b="1" dirty="0"/>
+              <a:t>Before thinking how to resolve bank conflict, let me check another problem, uncoalesced global store.</a:t>
+            </a:r>
+            <a:endParaRPr lang="zh-CN" altLang="en-US" sz="2400" b="1" dirty="0"/>
+          </a:p>
+        </p:txBody>
+      </p:sp>
     </p:spTree>
     <p:extLst>
       <p:ext uri="{BB962C8B-B14F-4D97-AF65-F5344CB8AC3E}">
-        <p14:creationId xmlns:p14="http://schemas.microsoft.com/office/powerpoint/2010/main" val="536758473"/>
+        <p14:creationId xmlns:p14="http://schemas.microsoft.com/office/powerpoint/2010/main" val="1857582931"/>
       </p:ext>
     </p:extLst>
   </p:cSld>
@@ -8330,7 +8428,7 @@
           <p:cNvPr id="2" name="文本框 1">
             <a:extLst>
               <a:ext uri="{FF2B5EF4-FFF2-40B4-BE49-F238E27FC236}">
-                <a16:creationId xmlns:a16="http://schemas.microsoft.com/office/drawing/2014/main" id="{24091B99-6A5E-1918-373C-63FC66434FC4}"/>
+                <a16:creationId xmlns:a16="http://schemas.microsoft.com/office/drawing/2014/main" id="{12C1AB39-C40A-965E-9B72-EC75E0CCE14F}"/>
               </a:ext>
             </a:extLst>
           </p:cNvPr>
@@ -8368,10 +8466,10 @@
       </p:sp>
       <p:sp>
         <p:nvSpPr>
-          <p:cNvPr id="5" name="文本框 4">
-            <a:extLst>
-              <a:ext uri="{FF2B5EF4-FFF2-40B4-BE49-F238E27FC236}">
-                <a16:creationId xmlns:a16="http://schemas.microsoft.com/office/drawing/2014/main" id="{BD794944-786F-8066-9CB7-4911EAE31323}"/>
+          <p:cNvPr id="6" name="文本框 5">
+            <a:extLst>
+              <a:ext uri="{FF2B5EF4-FFF2-40B4-BE49-F238E27FC236}">
+                <a16:creationId xmlns:a16="http://schemas.microsoft.com/office/drawing/2014/main" id="{C9F3A5F3-E08E-DA30-7CFA-35DF8A31F300}"/>
               </a:ext>
             </a:extLst>
           </p:cNvPr>
@@ -8380,8 +8478,8 @@
         </p:nvSpPr>
         <p:spPr>
           <a:xfrm>
-            <a:off x="2600517" y="5644295"/>
-            <a:ext cx="6776685" cy="707886"/>
+            <a:off x="1804252" y="2295620"/>
+            <a:ext cx="9291286" cy="1754326"/>
           </a:xfrm>
           <a:prstGeom prst="rect">
             <a:avLst/>
@@ -8389,31 +8487,114 @@
           <a:noFill/>
         </p:spPr>
         <p:txBody>
-          <a:bodyPr wrap="square" rtlCol="0">
+          <a:bodyPr wrap="square">
             <a:spAutoFit/>
           </a:bodyPr>
           <a:lstStyle/>
           <a:p>
             <a:r>
-              <a:rPr lang="en-US" altLang="zh-CN" sz="2000" b="1" dirty="0"/>
-              <a:t>That is why only 4 bytes from a 32 bytes fetch is useful. </a:t>
-            </a:r>
-          </a:p>
-          <a:p>
-            <a:r>
-              <a:rPr lang="en-US" altLang="zh-CN" sz="2000" b="1" dirty="0"/>
-              <a:t>I need to avoid stride between threads .</a:t>
-            </a:r>
-            <a:endParaRPr lang="zh-CN" altLang="en-US" sz="2000" b="1" dirty="0"/>
+              <a:rPr lang="en-US" altLang="zh-CN" b="0" i="0" dirty="0">
+                <a:effectLst/>
+                <a:latin typeface="inherit"/>
+              </a:rPr>
+              <a:t>Each cache line in the GPU is dedicated by sectors</a:t>
+            </a:r>
+            <a:r>
+              <a:rPr lang="en-US" altLang="zh-CN" b="0" i="0" dirty="0">
+                <a:effectLst/>
+                <a:latin typeface="gg sans"/>
+              </a:rPr>
+              <a:t>, which are the smallest unit of memory </a:t>
+            </a:r>
+            <a:r>
+              <a:rPr lang="en-US" altLang="zh-CN" dirty="0">
+                <a:latin typeface="gg sans"/>
+              </a:rPr>
+              <a:t>that</a:t>
+            </a:r>
+            <a:r>
+              <a:rPr lang="en-US" altLang="zh-CN" b="0" i="0" dirty="0">
+                <a:effectLst/>
+                <a:latin typeface="gg sans"/>
+              </a:rPr>
+              <a:t> can </a:t>
+            </a:r>
+            <a:r>
+              <a:rPr lang="en-US" altLang="zh-CN" dirty="0">
+                <a:latin typeface="gg sans"/>
+              </a:rPr>
+              <a:t>be </a:t>
+            </a:r>
+            <a:r>
+              <a:rPr lang="en-US" altLang="zh-CN" b="0" i="0" dirty="0">
+                <a:effectLst/>
+                <a:latin typeface="gg sans"/>
+              </a:rPr>
+              <a:t>transferred into the cache</a:t>
+            </a:r>
+            <a:r>
+              <a:rPr lang="en-US" altLang="zh-CN" b="0" i="0" dirty="0">
+                <a:effectLst/>
+                <a:latin typeface="inherit"/>
+              </a:rPr>
+              <a:t>. What it is telling </a:t>
+            </a:r>
+            <a:r>
+              <a:rPr lang="en-US" altLang="zh-CN" dirty="0">
+                <a:latin typeface="inherit"/>
+              </a:rPr>
+              <a:t>me</a:t>
+            </a:r>
+            <a:r>
+              <a:rPr lang="en-US" altLang="zh-CN" b="0" i="0" dirty="0">
+                <a:effectLst/>
+                <a:latin typeface="inherit"/>
+              </a:rPr>
+              <a:t> is that out of the 32 bytes that need to be fetched to get a full sector</a:t>
+            </a:r>
+            <a:r>
+              <a:rPr lang="en-US" altLang="zh-CN" b="0" i="0" dirty="0">
+                <a:effectLst/>
+                <a:latin typeface="gg sans"/>
+              </a:rPr>
+              <a:t>, only 1 byte is read by </a:t>
+            </a:r>
+            <a:r>
+              <a:rPr lang="en-US" altLang="zh-CN" dirty="0">
+                <a:latin typeface="gg sans"/>
+              </a:rPr>
+              <a:t>my</a:t>
+            </a:r>
+            <a:r>
+              <a:rPr lang="en-US" altLang="zh-CN" b="0" i="0" dirty="0">
+                <a:effectLst/>
+                <a:latin typeface="gg sans"/>
+              </a:rPr>
+              <a:t> kernel, whereas the rest is just eating up cache space and bandwidth.</a:t>
+            </a:r>
+          </a:p>
+          <a:p>
+            <a:endParaRPr lang="en-US" altLang="zh-CN" dirty="0">
+              <a:latin typeface="gg sans"/>
+            </a:endParaRPr>
+          </a:p>
+          <a:p>
+            <a:r>
+              <a:rPr lang="en-US" altLang="zh-CN" dirty="0">
+                <a:latin typeface="gg sans"/>
+              </a:rPr>
+              <a:t>Remember that in kernel 7, each thread computes an 8 x 8 square submatrix of C. Why it is bad ?</a:t>
+            </a:r>
+            <a:endParaRPr lang="zh-CN" altLang="en-US" dirty="0"/>
           </a:p>
         </p:txBody>
       </p:sp>
       <p:pic>
         <p:nvPicPr>
-          <p:cNvPr id="7" name="图片 6">
-            <a:extLst>
-              <a:ext uri="{FF2B5EF4-FFF2-40B4-BE49-F238E27FC236}">
-                <a16:creationId xmlns:a16="http://schemas.microsoft.com/office/drawing/2014/main" id="{E9282735-F694-2DF9-38A5-74866E4BC77A}"/>
+          <p:cNvPr id="8" name="图片 7">
+            <a:extLst>
+              <a:ext uri="{FF2B5EF4-FFF2-40B4-BE49-F238E27FC236}">
+                <a16:creationId xmlns:a16="http://schemas.microsoft.com/office/drawing/2014/main" id="{A35AEF39-5AA9-CF51-0BA5-87AACB199F7F}"/>
               </a:ext>
             </a:extLst>
           </p:cNvPr>
@@ -8430,54 +8611,48 @@
         </p:blipFill>
         <p:spPr>
           <a:xfrm>
-            <a:off x="788848" y="2190775"/>
-            <a:ext cx="10719141" cy="3018924"/>
+            <a:off x="144217" y="1210373"/>
+            <a:ext cx="11903565" cy="453802"/>
           </a:xfrm>
           <a:prstGeom prst="rect">
             <a:avLst/>
           </a:prstGeom>
         </p:spPr>
       </p:pic>
-      <p:sp>
-        <p:nvSpPr>
-          <p:cNvPr id="3" name="文本框 2">
-            <a:extLst>
-              <a:ext uri="{FF2B5EF4-FFF2-40B4-BE49-F238E27FC236}">
-                <a16:creationId xmlns:a16="http://schemas.microsoft.com/office/drawing/2014/main" id="{D4E7E911-12C9-2485-8070-3A545995D4F1}"/>
-              </a:ext>
-            </a:extLst>
-          </p:cNvPr>
-          <p:cNvSpPr txBox="1"/>
-          <p:nvPr/>
-        </p:nvSpPr>
-        <p:spPr>
-          <a:xfrm>
-            <a:off x="239340" y="1186636"/>
-            <a:ext cx="4979082" cy="461665"/>
-          </a:xfrm>
-          <a:prstGeom prst="rect">
-            <a:avLst/>
-          </a:prstGeom>
-          <a:noFill/>
-        </p:spPr>
-        <p:txBody>
-          <a:bodyPr wrap="square" rtlCol="0">
-            <a:spAutoFit/>
-          </a:bodyPr>
-          <a:lstStyle/>
-          <a:p>
-            <a:r>
-              <a:rPr lang="en-US" altLang="zh-CN" sz="2400" b="1" dirty="0"/>
-              <a:t>Global store pattern of C:</a:t>
-            </a:r>
-            <a:endParaRPr lang="zh-CN" altLang="en-US" sz="2400" b="1" dirty="0"/>
-          </a:p>
-        </p:txBody>
-      </p:sp>
+      <p:pic>
+        <p:nvPicPr>
+          <p:cNvPr id="10" name="图片 9">
+            <a:extLst>
+              <a:ext uri="{FF2B5EF4-FFF2-40B4-BE49-F238E27FC236}">
+                <a16:creationId xmlns:a16="http://schemas.microsoft.com/office/drawing/2014/main" id="{8ADD4441-0A34-3918-D237-26ADD9AFB948}"/>
+              </a:ext>
+            </a:extLst>
+          </p:cNvPr>
+          <p:cNvPicPr>
+            <a:picLocks noChangeAspect="1"/>
+          </p:cNvPicPr>
+          <p:nvPr/>
+        </p:nvPicPr>
+        <p:blipFill>
+          <a:blip r:embed="rId3"/>
+          <a:stretch>
+            <a:fillRect/>
+          </a:stretch>
+        </p:blipFill>
+        <p:spPr>
+          <a:xfrm>
+            <a:off x="144216" y="4804446"/>
+            <a:ext cx="11903565" cy="1039562"/>
+          </a:xfrm>
+          <a:prstGeom prst="rect">
+            <a:avLst/>
+          </a:prstGeom>
+        </p:spPr>
+      </p:pic>
     </p:spTree>
     <p:extLst>
       <p:ext uri="{BB962C8B-B14F-4D97-AF65-F5344CB8AC3E}">
-        <p14:creationId xmlns:p14="http://schemas.microsoft.com/office/powerpoint/2010/main" val="3253413955"/>
+        <p14:creationId xmlns:p14="http://schemas.microsoft.com/office/powerpoint/2010/main" val="536758473"/>
       </p:ext>
     </p:extLst>
   </p:cSld>
@@ -8509,7 +8684,7 @@
           <p:cNvPr id="2" name="文本框 1">
             <a:extLst>
               <a:ext uri="{FF2B5EF4-FFF2-40B4-BE49-F238E27FC236}">
-                <a16:creationId xmlns:a16="http://schemas.microsoft.com/office/drawing/2014/main" id="{A770D929-5EA8-CCC5-25C5-DC15A7DA2772}"/>
+                <a16:creationId xmlns:a16="http://schemas.microsoft.com/office/drawing/2014/main" id="{24091B99-6A5E-1918-373C-63FC66434FC4}"/>
               </a:ext>
             </a:extLst>
           </p:cNvPr>
@@ -8547,10 +8722,10 @@
       </p:sp>
       <p:sp>
         <p:nvSpPr>
-          <p:cNvPr id="3" name="文本框 2">
-            <a:extLst>
-              <a:ext uri="{FF2B5EF4-FFF2-40B4-BE49-F238E27FC236}">
-                <a16:creationId xmlns:a16="http://schemas.microsoft.com/office/drawing/2014/main" id="{D59F4806-ECA1-4973-9828-6106C35F4113}"/>
+          <p:cNvPr id="5" name="文本框 4">
+            <a:extLst>
+              <a:ext uri="{FF2B5EF4-FFF2-40B4-BE49-F238E27FC236}">
+                <a16:creationId xmlns:a16="http://schemas.microsoft.com/office/drawing/2014/main" id="{BD794944-786F-8066-9CB7-4911EAE31323}"/>
               </a:ext>
             </a:extLst>
           </p:cNvPr>
@@ -8559,8 +8734,8 @@
         </p:nvSpPr>
         <p:spPr>
           <a:xfrm>
-            <a:off x="1307162" y="1969948"/>
-            <a:ext cx="10230233" cy="3170099"/>
+            <a:off x="2600517" y="5644295"/>
+            <a:ext cx="6776685" cy="707886"/>
           </a:xfrm>
           <a:prstGeom prst="rect">
             <a:avLst/>
@@ -8575,58 +8750,88 @@
           <a:p>
             <a:r>
               <a:rPr lang="en-US" altLang="zh-CN" sz="2000" b="1" dirty="0"/>
-              <a:t>Let me conclude the two problems:</a:t>
-            </a:r>
-          </a:p>
-          <a:p>
-            <a:endParaRPr lang="en-US" altLang="zh-CN" sz="2000" b="1" dirty="0"/>
-          </a:p>
-          <a:p>
-            <a:pPr marL="285750" indent="-285750">
-              <a:buFont typeface="Arial" panose="020B0604020202020204" pitchFamily="34" charset="0"/>
-              <a:buChar char="•"/>
-            </a:pPr>
+              <a:t>That is why only 4 bytes from a 32 bytes fetch is useful. </a:t>
+            </a:r>
+          </a:p>
+          <a:p>
             <a:r>
               <a:rPr lang="en-US" altLang="zh-CN" sz="2000" b="1" dirty="0"/>
-              <a:t>The access pattern for shared memory is bad, I need to arrange how threads within a warp access shared memory.</a:t>
-            </a:r>
-          </a:p>
-          <a:p>
-            <a:pPr marL="285750" indent="-285750">
-              <a:buFont typeface="Arial" panose="020B0604020202020204" pitchFamily="34" charset="0"/>
-              <a:buChar char="•"/>
-            </a:pPr>
-            <a:endParaRPr lang="en-US" altLang="zh-CN" sz="2000" b="1" dirty="0"/>
-          </a:p>
-          <a:p>
-            <a:pPr marL="285750" indent="-285750">
-              <a:buFont typeface="Arial" panose="020B0604020202020204" pitchFamily="34" charset="0"/>
-              <a:buChar char="•"/>
-            </a:pPr>
-            <a:r>
-              <a:rPr lang="en-US" altLang="zh-CN" sz="2000" b="1" dirty="0"/>
-              <a:t>The global store pattern is bad due to stride between threads. I need to arrange how threads within a warp access global memory.</a:t>
-            </a:r>
-          </a:p>
-          <a:p>
-            <a:pPr marL="285750" indent="-285750">
-              <a:buFont typeface="Arial" panose="020B0604020202020204" pitchFamily="34" charset="0"/>
-              <a:buChar char="•"/>
-            </a:pPr>
-            <a:endParaRPr lang="en-US" altLang="zh-CN" sz="2000" b="1" dirty="0"/>
-          </a:p>
-          <a:p>
-            <a:r>
-              <a:rPr lang="en-US" altLang="zh-CN" sz="2000" b="1" dirty="0"/>
-              <a:t>Now the optimization direction is quite clear, in addition to block level parallelism, I need to introduce the warp level parallelism.</a:t>
-            </a:r>
+              <a:t>I need to avoid stride between threads .</a:t>
+            </a:r>
+            <a:endParaRPr lang="zh-CN" altLang="en-US" sz="2000" b="1" dirty="0"/>
+          </a:p>
+        </p:txBody>
+      </p:sp>
+      <p:pic>
+        <p:nvPicPr>
+          <p:cNvPr id="7" name="图片 6">
+            <a:extLst>
+              <a:ext uri="{FF2B5EF4-FFF2-40B4-BE49-F238E27FC236}">
+                <a16:creationId xmlns:a16="http://schemas.microsoft.com/office/drawing/2014/main" id="{E9282735-F694-2DF9-38A5-74866E4BC77A}"/>
+              </a:ext>
+            </a:extLst>
+          </p:cNvPr>
+          <p:cNvPicPr>
+            <a:picLocks noChangeAspect="1"/>
+          </p:cNvPicPr>
+          <p:nvPr/>
+        </p:nvPicPr>
+        <p:blipFill>
+          <a:blip r:embed="rId2"/>
+          <a:stretch>
+            <a:fillRect/>
+          </a:stretch>
+        </p:blipFill>
+        <p:spPr>
+          <a:xfrm>
+            <a:off x="788848" y="2190775"/>
+            <a:ext cx="10719141" cy="3018924"/>
+          </a:xfrm>
+          <a:prstGeom prst="rect">
+            <a:avLst/>
+          </a:prstGeom>
+        </p:spPr>
+      </p:pic>
+      <p:sp>
+        <p:nvSpPr>
+          <p:cNvPr id="3" name="文本框 2">
+            <a:extLst>
+              <a:ext uri="{FF2B5EF4-FFF2-40B4-BE49-F238E27FC236}">
+                <a16:creationId xmlns:a16="http://schemas.microsoft.com/office/drawing/2014/main" id="{D4E7E911-12C9-2485-8070-3A545995D4F1}"/>
+              </a:ext>
+            </a:extLst>
+          </p:cNvPr>
+          <p:cNvSpPr txBox="1"/>
+          <p:nvPr/>
+        </p:nvSpPr>
+        <p:spPr>
+          <a:xfrm>
+            <a:off x="239340" y="1186636"/>
+            <a:ext cx="4979082" cy="461665"/>
+          </a:xfrm>
+          <a:prstGeom prst="rect">
+            <a:avLst/>
+          </a:prstGeom>
+          <a:noFill/>
+        </p:spPr>
+        <p:txBody>
+          <a:bodyPr wrap="square" rtlCol="0">
+            <a:spAutoFit/>
+          </a:bodyPr>
+          <a:lstStyle/>
+          <a:p>
+            <a:r>
+              <a:rPr lang="en-US" altLang="zh-CN" sz="2400" b="1" dirty="0"/>
+              <a:t>Global store pattern of C:</a:t>
+            </a:r>
+            <a:endParaRPr lang="zh-CN" altLang="en-US" sz="2400" b="1" dirty="0"/>
           </a:p>
         </p:txBody>
       </p:sp>
     </p:spTree>
     <p:extLst>
       <p:ext uri="{BB962C8B-B14F-4D97-AF65-F5344CB8AC3E}">
-        <p14:creationId xmlns:p14="http://schemas.microsoft.com/office/powerpoint/2010/main" val="3716740816"/>
+        <p14:creationId xmlns:p14="http://schemas.microsoft.com/office/powerpoint/2010/main" val="3253413955"/>
       </p:ext>
     </p:extLst>
   </p:cSld>
@@ -8653,42 +8858,12 @@
           <a:chExt cx="0" cy="0"/>
         </a:xfrm>
       </p:grpSpPr>
-      <p:pic>
-        <p:nvPicPr>
-          <p:cNvPr id="3" name="图片 2">
-            <a:extLst>
-              <a:ext uri="{FF2B5EF4-FFF2-40B4-BE49-F238E27FC236}">
-                <a16:creationId xmlns:a16="http://schemas.microsoft.com/office/drawing/2014/main" id="{E415590D-8F86-441B-8686-DFDC5C27079A}"/>
-              </a:ext>
-            </a:extLst>
-          </p:cNvPr>
-          <p:cNvPicPr>
-            <a:picLocks noChangeAspect="1"/>
-          </p:cNvPicPr>
-          <p:nvPr/>
-        </p:nvPicPr>
-        <p:blipFill>
-          <a:blip r:embed="rId2"/>
-          <a:stretch>
-            <a:fillRect/>
-          </a:stretch>
-        </p:blipFill>
-        <p:spPr>
-          <a:xfrm>
-            <a:off x="214790" y="2408316"/>
-            <a:ext cx="11879017" cy="1705824"/>
-          </a:xfrm>
-          <a:prstGeom prst="rect">
-            <a:avLst/>
-          </a:prstGeom>
-        </p:spPr>
-      </p:pic>
-      <p:sp>
-        <p:nvSpPr>
-          <p:cNvPr id="4" name="文本框 3">
-            <a:extLst>
-              <a:ext uri="{FF2B5EF4-FFF2-40B4-BE49-F238E27FC236}">
-                <a16:creationId xmlns:a16="http://schemas.microsoft.com/office/drawing/2014/main" id="{9E5073A1-58A3-3F75-4221-F0A800AB41F7}"/>
+      <p:sp>
+        <p:nvSpPr>
+          <p:cNvPr id="2" name="文本框 1">
+            <a:extLst>
+              <a:ext uri="{FF2B5EF4-FFF2-40B4-BE49-F238E27FC236}">
+                <a16:creationId xmlns:a16="http://schemas.microsoft.com/office/drawing/2014/main" id="{A770D929-5EA8-CCC5-25C5-DC15A7DA2772}"/>
               </a:ext>
             </a:extLst>
           </p:cNvPr>
@@ -8726,10 +8901,10 @@
       </p:sp>
       <p:sp>
         <p:nvSpPr>
-          <p:cNvPr id="5" name="文本框 4">
-            <a:extLst>
-              <a:ext uri="{FF2B5EF4-FFF2-40B4-BE49-F238E27FC236}">
-                <a16:creationId xmlns:a16="http://schemas.microsoft.com/office/drawing/2014/main" id="{B3CA1060-874A-5001-CB77-E6A2C351F599}"/>
+          <p:cNvPr id="3" name="文本框 2">
+            <a:extLst>
+              <a:ext uri="{FF2B5EF4-FFF2-40B4-BE49-F238E27FC236}">
+                <a16:creationId xmlns:a16="http://schemas.microsoft.com/office/drawing/2014/main" id="{D59F4806-ECA1-4973-9828-6106C35F4113}"/>
               </a:ext>
             </a:extLst>
           </p:cNvPr>
@@ -8738,8 +8913,8 @@
         </p:nvSpPr>
         <p:spPr>
           <a:xfrm>
-            <a:off x="1098508" y="4768381"/>
-            <a:ext cx="9536762" cy="707886"/>
+            <a:off x="1307162" y="1969948"/>
+            <a:ext cx="10230233" cy="3170099"/>
           </a:xfrm>
           <a:prstGeom prst="rect">
             <a:avLst/>
@@ -8754,65 +8929,58 @@
           <a:p>
             <a:r>
               <a:rPr lang="en-US" altLang="zh-CN" sz="2000" b="1" dirty="0"/>
-              <a:t>I choose the second way, thread-level matrix computations issued to </a:t>
-            </a:r>
-            <a:r>
-              <a:rPr lang="en-US" altLang="zh-CN" sz="2000" b="1" dirty="0" err="1"/>
-              <a:t>cuda</a:t>
-            </a:r>
+              <a:t>Let me conclude the two problems:</a:t>
+            </a:r>
+          </a:p>
+          <a:p>
+            <a:endParaRPr lang="en-US" altLang="zh-CN" sz="2000" b="1" dirty="0"/>
+          </a:p>
+          <a:p>
+            <a:pPr marL="285750" indent="-285750">
+              <a:buFont typeface="Arial" panose="020B0604020202020204" pitchFamily="34" charset="0"/>
+              <a:buChar char="•"/>
+            </a:pPr>
             <a:r>
               <a:rPr lang="en-US" altLang="zh-CN" sz="2000" b="1" dirty="0"/>
-              <a:t> cores.</a:t>
-            </a:r>
-          </a:p>
-          <a:p>
+              <a:t>The access pattern for shared memory is bad, I need to arrange how threads within a warp access shared memory.</a:t>
+            </a:r>
+          </a:p>
+          <a:p>
+            <a:pPr marL="285750" indent="-285750">
+              <a:buFont typeface="Arial" panose="020B0604020202020204" pitchFamily="34" charset="0"/>
+              <a:buChar char="•"/>
+            </a:pPr>
+            <a:endParaRPr lang="en-US" altLang="zh-CN" sz="2000" b="1" dirty="0"/>
+          </a:p>
+          <a:p>
+            <a:pPr marL="285750" indent="-285750">
+              <a:buFont typeface="Arial" panose="020B0604020202020204" pitchFamily="34" charset="0"/>
+              <a:buChar char="•"/>
+            </a:pPr>
             <a:r>
               <a:rPr lang="en-US" altLang="zh-CN" sz="2000" b="1" dirty="0"/>
-              <a:t>Utilizing tensor cores typically needs mixed precision.</a:t>
-            </a:r>
-          </a:p>
-        </p:txBody>
-      </p:sp>
-      <p:sp>
-        <p:nvSpPr>
-          <p:cNvPr id="6" name="文本框 5">
-            <a:extLst>
-              <a:ext uri="{FF2B5EF4-FFF2-40B4-BE49-F238E27FC236}">
-                <a16:creationId xmlns:a16="http://schemas.microsoft.com/office/drawing/2014/main" id="{7A888A1B-CED2-73B5-36D5-060A86683096}"/>
-              </a:ext>
-            </a:extLst>
-          </p:cNvPr>
-          <p:cNvSpPr txBox="1"/>
-          <p:nvPr/>
-        </p:nvSpPr>
-        <p:spPr>
-          <a:xfrm>
-            <a:off x="276161" y="1274662"/>
-            <a:ext cx="4504494" cy="400110"/>
-          </a:xfrm>
-          <a:prstGeom prst="rect">
-            <a:avLst/>
-          </a:prstGeom>
-          <a:noFill/>
-        </p:spPr>
-        <p:txBody>
-          <a:bodyPr wrap="square" rtlCol="0">
-            <a:spAutoFit/>
-          </a:bodyPr>
-          <a:lstStyle/>
+              <a:t>The global store pattern is bad due to stride between threads. I need to arrange how threads within a warp access global memory.</a:t>
+            </a:r>
+          </a:p>
+          <a:p>
+            <a:pPr marL="285750" indent="-285750">
+              <a:buFont typeface="Arial" panose="020B0604020202020204" pitchFamily="34" charset="0"/>
+              <a:buChar char="•"/>
+            </a:pPr>
+            <a:endParaRPr lang="en-US" altLang="zh-CN" sz="2000" b="1" dirty="0"/>
+          </a:p>
           <a:p>
             <a:r>
               <a:rPr lang="en-US" altLang="zh-CN" sz="2000" b="1" dirty="0"/>
-              <a:t>The cutlass document says that . . .</a:t>
-            </a:r>
-            <a:endParaRPr lang="zh-CN" altLang="en-US" sz="2000" b="1" dirty="0"/>
+              <a:t>Now the optimization direction is quite clear, in addition to block level parallelism, I need to introduce the warp level parallelism.</a:t>
+            </a:r>
           </a:p>
         </p:txBody>
       </p:sp>
     </p:spTree>
     <p:extLst>
       <p:ext uri="{BB962C8B-B14F-4D97-AF65-F5344CB8AC3E}">
-        <p14:creationId xmlns:p14="http://schemas.microsoft.com/office/powerpoint/2010/main" val="2328979769"/>
+        <p14:creationId xmlns:p14="http://schemas.microsoft.com/office/powerpoint/2010/main" val="3716740816"/>
       </p:ext>
     </p:extLst>
   </p:cSld>
@@ -8839,12 +9007,42 @@
           <a:chExt cx="0" cy="0"/>
         </a:xfrm>
       </p:grpSpPr>
-      <p:sp>
-        <p:nvSpPr>
-          <p:cNvPr id="2" name="文本框 1">
-            <a:extLst>
-              <a:ext uri="{FF2B5EF4-FFF2-40B4-BE49-F238E27FC236}">
-                <a16:creationId xmlns:a16="http://schemas.microsoft.com/office/drawing/2014/main" id="{E6DC90D0-3B34-9019-2880-E290A09AFE8F}"/>
+      <p:pic>
+        <p:nvPicPr>
+          <p:cNvPr id="3" name="图片 2">
+            <a:extLst>
+              <a:ext uri="{FF2B5EF4-FFF2-40B4-BE49-F238E27FC236}">
+                <a16:creationId xmlns:a16="http://schemas.microsoft.com/office/drawing/2014/main" id="{E415590D-8F86-441B-8686-DFDC5C27079A}"/>
+              </a:ext>
+            </a:extLst>
+          </p:cNvPr>
+          <p:cNvPicPr>
+            <a:picLocks noChangeAspect="1"/>
+          </p:cNvPicPr>
+          <p:nvPr/>
+        </p:nvPicPr>
+        <p:blipFill>
+          <a:blip r:embed="rId2"/>
+          <a:stretch>
+            <a:fillRect/>
+          </a:stretch>
+        </p:blipFill>
+        <p:spPr>
+          <a:xfrm>
+            <a:off x="214790" y="2408316"/>
+            <a:ext cx="11879017" cy="1705824"/>
+          </a:xfrm>
+          <a:prstGeom prst="rect">
+            <a:avLst/>
+          </a:prstGeom>
+        </p:spPr>
+      </p:pic>
+      <p:sp>
+        <p:nvSpPr>
+          <p:cNvPr id="4" name="文本框 3">
+            <a:extLst>
+              <a:ext uri="{FF2B5EF4-FFF2-40B4-BE49-F238E27FC236}">
+                <a16:creationId xmlns:a16="http://schemas.microsoft.com/office/drawing/2014/main" id="{9E5073A1-58A3-3F75-4221-F0A800AB41F7}"/>
               </a:ext>
             </a:extLst>
           </p:cNvPr>
@@ -8882,10 +9080,10 @@
       </p:sp>
       <p:sp>
         <p:nvSpPr>
-          <p:cNvPr id="3" name="文本框 2">
-            <a:extLst>
-              <a:ext uri="{FF2B5EF4-FFF2-40B4-BE49-F238E27FC236}">
-                <a16:creationId xmlns:a16="http://schemas.microsoft.com/office/drawing/2014/main" id="{D28D6E02-D701-0B49-D325-99FB7A6DCBEB}"/>
+          <p:cNvPr id="5" name="文本框 4">
+            <a:extLst>
+              <a:ext uri="{FF2B5EF4-FFF2-40B4-BE49-F238E27FC236}">
+                <a16:creationId xmlns:a16="http://schemas.microsoft.com/office/drawing/2014/main" id="{B3CA1060-874A-5001-CB77-E6A2C351F599}"/>
               </a:ext>
             </a:extLst>
           </p:cNvPr>
@@ -8894,8 +9092,8 @@
         </p:nvSpPr>
         <p:spPr>
           <a:xfrm>
-            <a:off x="711881" y="1515817"/>
-            <a:ext cx="10586174" cy="4431983"/>
+            <a:off x="1098508" y="4768381"/>
+            <a:ext cx="9536762" cy="707886"/>
           </a:xfrm>
           <a:prstGeom prst="rect">
             <a:avLst/>
@@ -8909,84 +9107,66 @@
           <a:lstStyle/>
           <a:p>
             <a:r>
-              <a:rPr lang="en-US" altLang="zh-CN" sz="2400" b="1" dirty="0"/>
-              <a:t>To think in warp level:</a:t>
-            </a:r>
-          </a:p>
-          <a:p>
-            <a:endParaRPr lang="en-US" altLang="zh-CN" sz="2400" b="1" dirty="0"/>
-          </a:p>
-          <a:p>
-            <a:pPr marL="285750" indent="-285750">
-              <a:buFont typeface="Arial" panose="020B0604020202020204" pitchFamily="34" charset="0"/>
-              <a:buChar char="•"/>
-            </a:pPr>
-            <a:r>
-              <a:rPr lang="en-US" altLang="zh-CN" sz="2400" b="1" dirty="0"/>
-              <a:t>256 threads per block means 8 warps per block.</a:t>
-            </a:r>
-          </a:p>
-          <a:p>
-            <a:pPr marL="285750" indent="-285750">
-              <a:buFont typeface="Arial" panose="020B0604020202020204" pitchFamily="34" charset="0"/>
-              <a:buChar char="•"/>
-            </a:pPr>
-            <a:endParaRPr lang="en-US" altLang="zh-CN" sz="2400" b="1" dirty="0"/>
-          </a:p>
-          <a:p>
-            <a:pPr marL="285750" indent="-285750">
-              <a:buFont typeface="Arial" panose="020B0604020202020204" pitchFamily="34" charset="0"/>
-              <a:buChar char="•"/>
-            </a:pPr>
-            <a:endParaRPr lang="en-US" altLang="zh-CN" sz="2400" b="1" dirty="0"/>
-          </a:p>
-          <a:p>
-            <a:pPr marL="285750" indent="-285750">
-              <a:buFont typeface="Arial" panose="020B0604020202020204" pitchFamily="34" charset="0"/>
-              <a:buChar char="•"/>
-            </a:pPr>
-            <a:r>
-              <a:rPr lang="en-US" altLang="zh-CN" sz="2400" b="1" dirty="0"/>
-              <a:t>The size of A_TILE is 128 x 8, means each thread loads 4 elements, means each warp loads 4 x 32 = 128 elements. This is the same for B_TILE.</a:t>
-            </a:r>
-          </a:p>
-          <a:p>
-            <a:pPr marL="285750" indent="-285750">
-              <a:buFont typeface="Arial" panose="020B0604020202020204" pitchFamily="34" charset="0"/>
-              <a:buChar char="•"/>
-            </a:pPr>
-            <a:endParaRPr lang="en-US" altLang="zh-CN" sz="2400" b="1" dirty="0"/>
-          </a:p>
-          <a:p>
-            <a:pPr marL="285750" indent="-285750">
-              <a:buFont typeface="Arial" panose="020B0604020202020204" pitchFamily="34" charset="0"/>
-              <a:buChar char="•"/>
-            </a:pPr>
-            <a:endParaRPr lang="en-US" altLang="zh-CN" sz="2400" b="1" dirty="0"/>
-          </a:p>
-          <a:p>
-            <a:pPr marL="285750" indent="-285750">
-              <a:buFont typeface="Arial" panose="020B0604020202020204" pitchFamily="34" charset="0"/>
-              <a:buChar char="•"/>
-            </a:pPr>
-            <a:r>
-              <a:rPr lang="en-US" altLang="zh-CN" sz="2400" b="1" dirty="0"/>
-              <a:t>The size of C_TILE is 128 x 128, means each thread computes 64 elements, means each warp computes 64 x 32 = 2048 elements.</a:t>
-            </a:r>
-          </a:p>
-          <a:p>
-            <a:pPr marL="285750" indent="-285750">
-              <a:buFont typeface="Arial" panose="020B0604020202020204" pitchFamily="34" charset="0"/>
-              <a:buChar char="•"/>
-            </a:pPr>
-            <a:endParaRPr lang="zh-CN" altLang="en-US" dirty="0"/>
+              <a:rPr lang="en-US" altLang="zh-CN" sz="2000" b="1" dirty="0"/>
+              <a:t>I choose the second way, thread-level matrix computations issued to </a:t>
+            </a:r>
+            <a:r>
+              <a:rPr lang="en-US" altLang="zh-CN" sz="2000" b="1" dirty="0" err="1"/>
+              <a:t>cuda</a:t>
+            </a:r>
+            <a:r>
+              <a:rPr lang="en-US" altLang="zh-CN" sz="2000" b="1" dirty="0"/>
+              <a:t> cores.</a:t>
+            </a:r>
+          </a:p>
+          <a:p>
+            <a:r>
+              <a:rPr lang="en-US" altLang="zh-CN" sz="2000" b="1" dirty="0"/>
+              <a:t>Utilizing tensor cores typically needs mixed precision.</a:t>
+            </a:r>
+          </a:p>
+        </p:txBody>
+      </p:sp>
+      <p:sp>
+        <p:nvSpPr>
+          <p:cNvPr id="6" name="文本框 5">
+            <a:extLst>
+              <a:ext uri="{FF2B5EF4-FFF2-40B4-BE49-F238E27FC236}">
+                <a16:creationId xmlns:a16="http://schemas.microsoft.com/office/drawing/2014/main" id="{7A888A1B-CED2-73B5-36D5-060A86683096}"/>
+              </a:ext>
+            </a:extLst>
+          </p:cNvPr>
+          <p:cNvSpPr txBox="1"/>
+          <p:nvPr/>
+        </p:nvSpPr>
+        <p:spPr>
+          <a:xfrm>
+            <a:off x="276161" y="1274662"/>
+            <a:ext cx="4504494" cy="400110"/>
+          </a:xfrm>
+          <a:prstGeom prst="rect">
+            <a:avLst/>
+          </a:prstGeom>
+          <a:noFill/>
+        </p:spPr>
+        <p:txBody>
+          <a:bodyPr wrap="square" rtlCol="0">
+            <a:spAutoFit/>
+          </a:bodyPr>
+          <a:lstStyle/>
+          <a:p>
+            <a:r>
+              <a:rPr lang="en-US" altLang="zh-CN" sz="2000" b="1" dirty="0"/>
+              <a:t>The cutlass document says that . . .</a:t>
+            </a:r>
+            <a:endParaRPr lang="zh-CN" altLang="en-US" sz="2000" b="1" dirty="0"/>
           </a:p>
         </p:txBody>
       </p:sp>
     </p:spTree>
     <p:extLst>
       <p:ext uri="{BB962C8B-B14F-4D97-AF65-F5344CB8AC3E}">
-        <p14:creationId xmlns:p14="http://schemas.microsoft.com/office/powerpoint/2010/main" val="2066971635"/>
+        <p14:creationId xmlns:p14="http://schemas.microsoft.com/office/powerpoint/2010/main" val="2328979769"/>
       </p:ext>
     </p:extLst>
   </p:cSld>
@@ -9018,7 +9198,7 @@
           <p:cNvPr id="2" name="文本框 1">
             <a:extLst>
               <a:ext uri="{FF2B5EF4-FFF2-40B4-BE49-F238E27FC236}">
-                <a16:creationId xmlns:a16="http://schemas.microsoft.com/office/drawing/2014/main" id="{165CC7E4-F2B6-A22C-2E9D-37C4B244B6E7}"/>
+                <a16:creationId xmlns:a16="http://schemas.microsoft.com/office/drawing/2014/main" id="{E6DC90D0-3B34-9019-2880-E290A09AFE8F}"/>
               </a:ext>
             </a:extLst>
           </p:cNvPr>
@@ -9054,100 +9234,113 @@
           </a:p>
         </p:txBody>
       </p:sp>
-      <p:pic>
-        <p:nvPicPr>
-          <p:cNvPr id="10" name="图片 9">
-            <a:extLst>
-              <a:ext uri="{FF2B5EF4-FFF2-40B4-BE49-F238E27FC236}">
-                <a16:creationId xmlns:a16="http://schemas.microsoft.com/office/drawing/2014/main" id="{689FE4A3-08B4-1A81-89DA-F20823E683A9}"/>
-              </a:ext>
-            </a:extLst>
-          </p:cNvPr>
-          <p:cNvPicPr>
-            <a:picLocks noChangeAspect="1"/>
-          </p:cNvPicPr>
-          <p:nvPr/>
-        </p:nvPicPr>
-        <p:blipFill>
-          <a:blip r:embed="rId2"/>
-          <a:stretch>
-            <a:fillRect/>
-          </a:stretch>
-        </p:blipFill>
-        <p:spPr>
-          <a:xfrm>
-            <a:off x="304800" y="1110673"/>
-            <a:ext cx="5444297" cy="3224662"/>
-          </a:xfrm>
-          <a:prstGeom prst="rect">
-            <a:avLst/>
-          </a:prstGeom>
-        </p:spPr>
-      </p:pic>
-      <p:pic>
-        <p:nvPicPr>
-          <p:cNvPr id="12" name="图片 11">
-            <a:extLst>
-              <a:ext uri="{FF2B5EF4-FFF2-40B4-BE49-F238E27FC236}">
-                <a16:creationId xmlns:a16="http://schemas.microsoft.com/office/drawing/2014/main" id="{EF4748E1-666B-CCED-00F5-0B40EF2DDE5C}"/>
-              </a:ext>
-            </a:extLst>
-          </p:cNvPr>
-          <p:cNvPicPr>
-            <a:picLocks noChangeAspect="1"/>
-          </p:cNvPicPr>
-          <p:nvPr/>
-        </p:nvPicPr>
-        <p:blipFill>
-          <a:blip r:embed="rId3"/>
-          <a:stretch>
-            <a:fillRect/>
-          </a:stretch>
-        </p:blipFill>
-        <p:spPr>
-          <a:xfrm>
-            <a:off x="433196" y="4843610"/>
-            <a:ext cx="5444297" cy="1344584"/>
-          </a:xfrm>
-          <a:prstGeom prst="rect">
-            <a:avLst/>
-          </a:prstGeom>
-        </p:spPr>
-      </p:pic>
-      <p:pic>
-        <p:nvPicPr>
-          <p:cNvPr id="14" name="图片 13">
-            <a:extLst>
-              <a:ext uri="{FF2B5EF4-FFF2-40B4-BE49-F238E27FC236}">
-                <a16:creationId xmlns:a16="http://schemas.microsoft.com/office/drawing/2014/main" id="{42323A14-A028-5642-1E37-A43A680A2A35}"/>
-              </a:ext>
-            </a:extLst>
-          </p:cNvPr>
-          <p:cNvPicPr>
-            <a:picLocks noChangeAspect="1"/>
-          </p:cNvPicPr>
-          <p:nvPr/>
-        </p:nvPicPr>
-        <p:blipFill>
-          <a:blip r:embed="rId4"/>
-          <a:stretch>
-            <a:fillRect/>
-          </a:stretch>
-        </p:blipFill>
-        <p:spPr>
-          <a:xfrm>
-            <a:off x="6314509" y="1403411"/>
-            <a:ext cx="5443240" cy="4096327"/>
-          </a:xfrm>
-          <a:prstGeom prst="rect">
-            <a:avLst/>
-          </a:prstGeom>
-        </p:spPr>
-      </p:pic>
+      <p:sp>
+        <p:nvSpPr>
+          <p:cNvPr id="3" name="文本框 2">
+            <a:extLst>
+              <a:ext uri="{FF2B5EF4-FFF2-40B4-BE49-F238E27FC236}">
+                <a16:creationId xmlns:a16="http://schemas.microsoft.com/office/drawing/2014/main" id="{D28D6E02-D701-0B49-D325-99FB7A6DCBEB}"/>
+              </a:ext>
+            </a:extLst>
+          </p:cNvPr>
+          <p:cNvSpPr txBox="1"/>
+          <p:nvPr/>
+        </p:nvSpPr>
+        <p:spPr>
+          <a:xfrm>
+            <a:off x="711881" y="1515817"/>
+            <a:ext cx="10586174" cy="4431983"/>
+          </a:xfrm>
+          <a:prstGeom prst="rect">
+            <a:avLst/>
+          </a:prstGeom>
+          <a:noFill/>
+        </p:spPr>
+        <p:txBody>
+          <a:bodyPr wrap="square" rtlCol="0">
+            <a:spAutoFit/>
+          </a:bodyPr>
+          <a:lstStyle/>
+          <a:p>
+            <a:r>
+              <a:rPr lang="en-US" altLang="zh-CN" sz="2400" b="1" dirty="0"/>
+              <a:t>To think in warp level:</a:t>
+            </a:r>
+          </a:p>
+          <a:p>
+            <a:endParaRPr lang="en-US" altLang="zh-CN" sz="2400" b="1" dirty="0"/>
+          </a:p>
+          <a:p>
+            <a:pPr marL="285750" indent="-285750">
+              <a:buFont typeface="Arial" panose="020B0604020202020204" pitchFamily="34" charset="0"/>
+              <a:buChar char="•"/>
+            </a:pPr>
+            <a:r>
+              <a:rPr lang="en-US" altLang="zh-CN" sz="2400" b="1" dirty="0"/>
+              <a:t>256 threads per block means 8 warps per block.</a:t>
+            </a:r>
+          </a:p>
+          <a:p>
+            <a:pPr marL="285750" indent="-285750">
+              <a:buFont typeface="Arial" panose="020B0604020202020204" pitchFamily="34" charset="0"/>
+              <a:buChar char="•"/>
+            </a:pPr>
+            <a:endParaRPr lang="en-US" altLang="zh-CN" sz="2400" b="1" dirty="0"/>
+          </a:p>
+          <a:p>
+            <a:pPr marL="285750" indent="-285750">
+              <a:buFont typeface="Arial" panose="020B0604020202020204" pitchFamily="34" charset="0"/>
+              <a:buChar char="•"/>
+            </a:pPr>
+            <a:endParaRPr lang="en-US" altLang="zh-CN" sz="2400" b="1" dirty="0"/>
+          </a:p>
+          <a:p>
+            <a:pPr marL="285750" indent="-285750">
+              <a:buFont typeface="Arial" panose="020B0604020202020204" pitchFamily="34" charset="0"/>
+              <a:buChar char="•"/>
+            </a:pPr>
+            <a:r>
+              <a:rPr lang="en-US" altLang="zh-CN" sz="2400" b="1" dirty="0"/>
+              <a:t>The size of A_TILE is 128 x 8, means each thread loads 4 elements, means each warp loads 4 x 32 = 128 elements. This is the same for B_TILE.</a:t>
+            </a:r>
+          </a:p>
+          <a:p>
+            <a:pPr marL="285750" indent="-285750">
+              <a:buFont typeface="Arial" panose="020B0604020202020204" pitchFamily="34" charset="0"/>
+              <a:buChar char="•"/>
+            </a:pPr>
+            <a:endParaRPr lang="en-US" altLang="zh-CN" sz="2400" b="1" dirty="0"/>
+          </a:p>
+          <a:p>
+            <a:pPr marL="285750" indent="-285750">
+              <a:buFont typeface="Arial" panose="020B0604020202020204" pitchFamily="34" charset="0"/>
+              <a:buChar char="•"/>
+            </a:pPr>
+            <a:endParaRPr lang="en-US" altLang="zh-CN" sz="2400" b="1" dirty="0"/>
+          </a:p>
+          <a:p>
+            <a:pPr marL="285750" indent="-285750">
+              <a:buFont typeface="Arial" panose="020B0604020202020204" pitchFamily="34" charset="0"/>
+              <a:buChar char="•"/>
+            </a:pPr>
+            <a:r>
+              <a:rPr lang="en-US" altLang="zh-CN" sz="2400" b="1" dirty="0"/>
+              <a:t>The size of C_TILE is 128 x 128, means each thread computes 64 elements, means each warp computes 64 x 32 = 2048 elements.</a:t>
+            </a:r>
+          </a:p>
+          <a:p>
+            <a:pPr marL="285750" indent="-285750">
+              <a:buFont typeface="Arial" panose="020B0604020202020204" pitchFamily="34" charset="0"/>
+              <a:buChar char="•"/>
+            </a:pPr>
+            <a:endParaRPr lang="zh-CN" altLang="en-US" dirty="0"/>
+          </a:p>
+        </p:txBody>
+      </p:sp>
     </p:spTree>
     <p:extLst>
       <p:ext uri="{BB962C8B-B14F-4D97-AF65-F5344CB8AC3E}">
-        <p14:creationId xmlns:p14="http://schemas.microsoft.com/office/powerpoint/2010/main" val="1468604051"/>
+        <p14:creationId xmlns:p14="http://schemas.microsoft.com/office/powerpoint/2010/main" val="2066971635"/>
       </p:ext>
     </p:extLst>
   </p:cSld>
@@ -9179,7 +9372,7 @@
           <p:cNvPr id="2" name="文本框 1">
             <a:extLst>
               <a:ext uri="{FF2B5EF4-FFF2-40B4-BE49-F238E27FC236}">
-                <a16:creationId xmlns:a16="http://schemas.microsoft.com/office/drawing/2014/main" id="{7B1DCD9B-BDDD-095A-45A0-720E625F0CEA}"/>
+                <a16:creationId xmlns:a16="http://schemas.microsoft.com/office/drawing/2014/main" id="{165CC7E4-F2B6-A22C-2E9D-37C4B244B6E7}"/>
               </a:ext>
             </a:extLst>
           </p:cNvPr>
@@ -9217,10 +9410,40 @@
       </p:sp>
       <p:pic>
         <p:nvPicPr>
-          <p:cNvPr id="4" name="图片 3">
-            <a:extLst>
-              <a:ext uri="{FF2B5EF4-FFF2-40B4-BE49-F238E27FC236}">
-                <a16:creationId xmlns:a16="http://schemas.microsoft.com/office/drawing/2014/main" id="{81501B3B-E34E-B4D8-7370-C8CFFA8B6EDA}"/>
+          <p:cNvPr id="10" name="图片 9">
+            <a:extLst>
+              <a:ext uri="{FF2B5EF4-FFF2-40B4-BE49-F238E27FC236}">
+                <a16:creationId xmlns:a16="http://schemas.microsoft.com/office/drawing/2014/main" id="{689FE4A3-08B4-1A81-89DA-F20823E683A9}"/>
+              </a:ext>
+            </a:extLst>
+          </p:cNvPr>
+          <p:cNvPicPr>
+            <a:picLocks noChangeAspect="1"/>
+          </p:cNvPicPr>
+          <p:nvPr/>
+        </p:nvPicPr>
+        <p:blipFill>
+          <a:blip r:embed="rId2"/>
+          <a:stretch>
+            <a:fillRect/>
+          </a:stretch>
+        </p:blipFill>
+        <p:spPr>
+          <a:xfrm>
+            <a:off x="304800" y="1110673"/>
+            <a:ext cx="5444297" cy="3224662"/>
+          </a:xfrm>
+          <a:prstGeom prst="rect">
+            <a:avLst/>
+          </a:prstGeom>
+        </p:spPr>
+      </p:pic>
+      <p:pic>
+        <p:nvPicPr>
+          <p:cNvPr id="12" name="图片 11">
+            <a:extLst>
+              <a:ext uri="{FF2B5EF4-FFF2-40B4-BE49-F238E27FC236}">
+                <a16:creationId xmlns:a16="http://schemas.microsoft.com/office/drawing/2014/main" id="{EF4748E1-666B-CCED-00F5-0B40EF2DDE5C}"/>
               </a:ext>
             </a:extLst>
           </p:cNvPr>
@@ -9237,8 +9460,8 @@
         </p:blipFill>
         <p:spPr>
           <a:xfrm>
-            <a:off x="398109" y="1339040"/>
-            <a:ext cx="8977745" cy="1649343"/>
+            <a:off x="433196" y="4843610"/>
+            <a:ext cx="5444297" cy="1344584"/>
           </a:xfrm>
           <a:prstGeom prst="rect">
             <a:avLst/>
@@ -9247,10 +9470,10 @@
       </p:pic>
       <p:pic>
         <p:nvPicPr>
-          <p:cNvPr id="6" name="图片 5">
-            <a:extLst>
-              <a:ext uri="{FF2B5EF4-FFF2-40B4-BE49-F238E27FC236}">
-                <a16:creationId xmlns:a16="http://schemas.microsoft.com/office/drawing/2014/main" id="{75281AB1-3121-C79B-46E8-0A1BE881CCF7}"/>
+          <p:cNvPr id="14" name="图片 13">
+            <a:extLst>
+              <a:ext uri="{FF2B5EF4-FFF2-40B4-BE49-F238E27FC236}">
+                <a16:creationId xmlns:a16="http://schemas.microsoft.com/office/drawing/2014/main" id="{42323A14-A028-5642-1E37-A43A680A2A35}"/>
               </a:ext>
             </a:extLst>
           </p:cNvPr>
@@ -9267,168 +9490,18 @@
         </p:blipFill>
         <p:spPr>
           <a:xfrm>
-            <a:off x="481236" y="4410541"/>
-            <a:ext cx="8894618" cy="1811243"/>
+            <a:off x="6314509" y="1403411"/>
+            <a:ext cx="5443240" cy="4096327"/>
           </a:xfrm>
           <a:prstGeom prst="rect">
             <a:avLst/>
           </a:prstGeom>
         </p:spPr>
       </p:pic>
-      <p:sp>
-        <p:nvSpPr>
-          <p:cNvPr id="7" name="文本框 6">
-            <a:extLst>
-              <a:ext uri="{FF2B5EF4-FFF2-40B4-BE49-F238E27FC236}">
-                <a16:creationId xmlns:a16="http://schemas.microsoft.com/office/drawing/2014/main" id="{5C083ADA-12BA-DDA1-83AC-EB942ED434A9}"/>
-              </a:ext>
-            </a:extLst>
-          </p:cNvPr>
-          <p:cNvSpPr txBox="1"/>
-          <p:nvPr/>
-        </p:nvSpPr>
-        <p:spPr>
-          <a:xfrm>
-            <a:off x="1021563" y="3499407"/>
-            <a:ext cx="7730836" cy="400110"/>
-          </a:xfrm>
-          <a:prstGeom prst="rect">
-            <a:avLst/>
-          </a:prstGeom>
-          <a:noFill/>
-        </p:spPr>
-        <p:txBody>
-          <a:bodyPr wrap="square" rtlCol="0">
-            <a:spAutoFit/>
-          </a:bodyPr>
-          <a:lstStyle/>
-          <a:p>
-            <a:r>
-              <a:rPr lang="en-US" altLang="zh-CN" sz="2000" b="1" dirty="0"/>
-              <a:t>I avoid the bank conflict completely. I think this is impressive.</a:t>
-            </a:r>
-            <a:endParaRPr lang="zh-CN" altLang="en-US" sz="2000" b="1" dirty="0"/>
-          </a:p>
-        </p:txBody>
-      </p:sp>
-      <p:sp>
-        <p:nvSpPr>
-          <p:cNvPr id="8" name="文本框 7">
-            <a:extLst>
-              <a:ext uri="{FF2B5EF4-FFF2-40B4-BE49-F238E27FC236}">
-                <a16:creationId xmlns:a16="http://schemas.microsoft.com/office/drawing/2014/main" id="{9264583E-4B69-A90C-F7A0-0EFB1BD0083A}"/>
-              </a:ext>
-            </a:extLst>
-          </p:cNvPr>
-          <p:cNvSpPr txBox="1"/>
-          <p:nvPr/>
-        </p:nvSpPr>
-        <p:spPr>
-          <a:xfrm>
-            <a:off x="10086109" y="1985818"/>
-            <a:ext cx="1707782" cy="461665"/>
-          </a:xfrm>
-          <a:prstGeom prst="rect">
-            <a:avLst/>
-          </a:prstGeom>
-          <a:noFill/>
-        </p:spPr>
-        <p:txBody>
-          <a:bodyPr wrap="square" rtlCol="0">
-            <a:spAutoFit/>
-          </a:bodyPr>
-          <a:lstStyle/>
-          <a:p>
-            <a:r>
-              <a:rPr lang="en-US" altLang="zh-CN" sz="2400" b="1" dirty="0"/>
-              <a:t>kernel 07</a:t>
-            </a:r>
-            <a:endParaRPr lang="zh-CN" altLang="en-US" sz="2400" b="1" dirty="0"/>
-          </a:p>
-        </p:txBody>
-      </p:sp>
-      <p:sp>
-        <p:nvSpPr>
-          <p:cNvPr id="9" name="文本框 8">
-            <a:extLst>
-              <a:ext uri="{FF2B5EF4-FFF2-40B4-BE49-F238E27FC236}">
-                <a16:creationId xmlns:a16="http://schemas.microsoft.com/office/drawing/2014/main" id="{21FCE974-32F5-B0B2-AEBF-F545ED7628ED}"/>
-              </a:ext>
-            </a:extLst>
-          </p:cNvPr>
-          <p:cNvSpPr txBox="1"/>
-          <p:nvPr/>
-        </p:nvSpPr>
-        <p:spPr>
-          <a:xfrm>
-            <a:off x="10002982" y="5085329"/>
-            <a:ext cx="1707782" cy="461665"/>
-          </a:xfrm>
-          <a:prstGeom prst="rect">
-            <a:avLst/>
-          </a:prstGeom>
-          <a:noFill/>
-        </p:spPr>
-        <p:txBody>
-          <a:bodyPr wrap="square" rtlCol="0">
-            <a:spAutoFit/>
-          </a:bodyPr>
-          <a:lstStyle/>
-          <a:p>
-            <a:r>
-              <a:rPr lang="en-US" altLang="zh-CN" sz="2400" b="1" dirty="0"/>
-              <a:t>kernel 08</a:t>
-            </a:r>
-            <a:endParaRPr lang="zh-CN" altLang="en-US" sz="2400" b="1" dirty="0"/>
-          </a:p>
-        </p:txBody>
-      </p:sp>
-      <p:cxnSp>
-        <p:nvCxnSpPr>
-          <p:cNvPr id="11" name="直接箭头连接符 10">
-            <a:extLst>
-              <a:ext uri="{FF2B5EF4-FFF2-40B4-BE49-F238E27FC236}">
-                <a16:creationId xmlns:a16="http://schemas.microsoft.com/office/drawing/2014/main" id="{838F1A32-EFF9-8C0C-04E4-E699FC524773}"/>
-              </a:ext>
-            </a:extLst>
-          </p:cNvPr>
-          <p:cNvCxnSpPr/>
-          <p:nvPr/>
-        </p:nvCxnSpPr>
-        <p:spPr>
-          <a:xfrm>
-            <a:off x="10695709" y="2900218"/>
-            <a:ext cx="0" cy="1995055"/>
-          </a:xfrm>
-          <a:prstGeom prst="straightConnector1">
-            <a:avLst/>
-          </a:prstGeom>
-          <a:ln w="57150">
-            <a:solidFill>
-              <a:schemeClr val="tx1"/>
-            </a:solidFill>
-            <a:tailEnd type="triangle"/>
-          </a:ln>
-        </p:spPr>
-        <p:style>
-          <a:lnRef idx="1">
-            <a:schemeClr val="accent1"/>
-          </a:lnRef>
-          <a:fillRef idx="0">
-            <a:schemeClr val="accent1"/>
-          </a:fillRef>
-          <a:effectRef idx="0">
-            <a:schemeClr val="accent1"/>
-          </a:effectRef>
-          <a:fontRef idx="minor">
-            <a:schemeClr val="tx1"/>
-          </a:fontRef>
-        </p:style>
-      </p:cxnSp>
     </p:spTree>
     <p:extLst>
       <p:ext uri="{BB962C8B-B14F-4D97-AF65-F5344CB8AC3E}">
-        <p14:creationId xmlns:p14="http://schemas.microsoft.com/office/powerpoint/2010/main" val="650156779"/>
+        <p14:creationId xmlns:p14="http://schemas.microsoft.com/office/powerpoint/2010/main" val="1468604051"/>
       </p:ext>
     </p:extLst>
   </p:cSld>
@@ -9805,45 +9878,79 @@
           </a:bodyPr>
           <a:lstStyle/>
           <a:p>
-            <a:pPr marL="0" marR="0" lvl="0" indent="0" algn="l" defTabSz="914400" rtl="0" eaLnBrk="1" fontAlgn="auto" latinLnBrk="0" hangingPunct="1">
-              <a:lnSpc>
-                <a:spcPct val="100000"/>
-              </a:lnSpc>
-              <a:spcBef>
-                <a:spcPts val="0"/>
-              </a:spcBef>
-              <a:spcAft>
-                <a:spcPts val="0"/>
-              </a:spcAft>
-              <a:buClrTx/>
-              <a:buSzTx/>
-              <a:buFontTx/>
-              <a:buNone/>
-              <a:tabLst/>
-              <a:defRPr/>
-            </a:pPr>
-            <a:r>
-              <a:rPr kumimoji="0" lang="en-US" altLang="zh-CN" sz="2800" b="1" i="0" u="none" strike="noStrike" kern="1200" cap="none" spc="0" normalizeH="0" baseline="0" noProof="0" dirty="0">
-                <a:ln>
-                  <a:noFill/>
-                </a:ln>
+            <a:r>
+              <a:rPr lang="en-US" altLang="zh-CN" sz="2800" b="1" dirty="0">
                 <a:solidFill>
-                  <a:srgbClr val="70AD47">
+                  <a:schemeClr val="accent6">
                     <a:lumMod val="75000"/>
-                  </a:srgbClr>
+                  </a:schemeClr>
                 </a:solidFill>
-                <a:effectLst/>
-                <a:uLnTx/>
-                <a:uFillTx/>
-                <a:latin typeface="等线" panose="020F0502020204030204"/>
-                <a:ea typeface="等线" panose="02010600030101010101" pitchFamily="2" charset="-122"/>
-                <a:cs typeface="+mn-cs"/>
               </a:rPr>
               <a:t>Optimization worklog and concept illustration</a:t>
             </a:r>
           </a:p>
         </p:txBody>
       </p:sp>
+      <p:pic>
+        <p:nvPicPr>
+          <p:cNvPr id="4" name="图片 3">
+            <a:extLst>
+              <a:ext uri="{FF2B5EF4-FFF2-40B4-BE49-F238E27FC236}">
+                <a16:creationId xmlns:a16="http://schemas.microsoft.com/office/drawing/2014/main" id="{81501B3B-E34E-B4D8-7370-C8CFFA8B6EDA}"/>
+              </a:ext>
+            </a:extLst>
+          </p:cNvPr>
+          <p:cNvPicPr>
+            <a:picLocks noChangeAspect="1"/>
+          </p:cNvPicPr>
+          <p:nvPr/>
+        </p:nvPicPr>
+        <p:blipFill>
+          <a:blip r:embed="rId3"/>
+          <a:stretch>
+            <a:fillRect/>
+          </a:stretch>
+        </p:blipFill>
+        <p:spPr>
+          <a:xfrm>
+            <a:off x="398109" y="1339040"/>
+            <a:ext cx="8977745" cy="1649343"/>
+          </a:xfrm>
+          <a:prstGeom prst="rect">
+            <a:avLst/>
+          </a:prstGeom>
+        </p:spPr>
+      </p:pic>
+      <p:pic>
+        <p:nvPicPr>
+          <p:cNvPr id="6" name="图片 5">
+            <a:extLst>
+              <a:ext uri="{FF2B5EF4-FFF2-40B4-BE49-F238E27FC236}">
+                <a16:creationId xmlns:a16="http://schemas.microsoft.com/office/drawing/2014/main" id="{75281AB1-3121-C79B-46E8-0A1BE881CCF7}"/>
+              </a:ext>
+            </a:extLst>
+          </p:cNvPr>
+          <p:cNvPicPr>
+            <a:picLocks noChangeAspect="1"/>
+          </p:cNvPicPr>
+          <p:nvPr/>
+        </p:nvPicPr>
+        <p:blipFill>
+          <a:blip r:embed="rId4"/>
+          <a:stretch>
+            <a:fillRect/>
+          </a:stretch>
+        </p:blipFill>
+        <p:spPr>
+          <a:xfrm>
+            <a:off x="481236" y="4410541"/>
+            <a:ext cx="8894618" cy="1811243"/>
+          </a:xfrm>
+          <a:prstGeom prst="rect">
+            <a:avLst/>
+          </a:prstGeom>
+        </p:spPr>
+      </p:pic>
       <p:sp>
         <p:nvSpPr>
           <p:cNvPr id="7" name="文本框 6">
@@ -9858,8 +9965,8 @@
         </p:nvSpPr>
         <p:spPr>
           <a:xfrm>
-            <a:off x="1089891" y="3428627"/>
-            <a:ext cx="8198217" cy="707886"/>
+            <a:off x="1021563" y="3499407"/>
+            <a:ext cx="7730836" cy="400110"/>
           </a:xfrm>
           <a:prstGeom prst="rect">
             <a:avLst/>
@@ -9872,90 +9979,11 @@
           </a:bodyPr>
           <a:lstStyle/>
           <a:p>
-            <a:pPr marL="0" marR="0" lvl="0" indent="0" algn="l" defTabSz="914400" rtl="0" eaLnBrk="1" fontAlgn="auto" latinLnBrk="0" hangingPunct="1">
-              <a:lnSpc>
-                <a:spcPct val="100000"/>
-              </a:lnSpc>
-              <a:spcBef>
-                <a:spcPts val="0"/>
-              </a:spcBef>
-              <a:spcAft>
-                <a:spcPts val="0"/>
-              </a:spcAft>
-              <a:buClrTx/>
-              <a:buSzTx/>
-              <a:buFontTx/>
-              <a:buNone/>
-              <a:tabLst/>
-              <a:defRPr/>
-            </a:pPr>
-            <a:r>
-              <a:rPr kumimoji="0" lang="en-US" altLang="zh-CN" sz="2000" b="1" i="0" u="none" strike="noStrike" kern="1200" cap="none" spc="0" normalizeH="0" baseline="0" noProof="0" dirty="0">
-                <a:ln>
-                  <a:noFill/>
-                </a:ln>
-                <a:solidFill>
-                  <a:prstClr val="black"/>
-                </a:solidFill>
-                <a:effectLst/>
-                <a:uLnTx/>
-                <a:uFillTx/>
-                <a:latin typeface="等线" panose="020F0502020204030204"/>
-                <a:ea typeface="等线" panose="02010600030101010101" pitchFamily="2" charset="-122"/>
-                <a:cs typeface="+mn-cs"/>
-              </a:rPr>
-              <a:t>I optimized the global store pattern:</a:t>
-            </a:r>
-          </a:p>
-          <a:p>
-            <a:pPr marL="0" marR="0" lvl="0" indent="0" algn="l" defTabSz="914400" rtl="0" eaLnBrk="1" fontAlgn="auto" latinLnBrk="0" hangingPunct="1">
-              <a:lnSpc>
-                <a:spcPct val="100000"/>
-              </a:lnSpc>
-              <a:spcBef>
-                <a:spcPts val="0"/>
-              </a:spcBef>
-              <a:spcAft>
-                <a:spcPts val="0"/>
-              </a:spcAft>
-              <a:buClrTx/>
-              <a:buSzTx/>
-              <a:buFontTx/>
-              <a:buNone/>
-              <a:tabLst/>
-              <a:defRPr/>
-            </a:pPr>
-            <a:r>
-              <a:rPr kumimoji="0" lang="en-US" altLang="zh-CN" sz="2000" b="1" i="0" u="none" strike="noStrike" kern="1200" cap="none" spc="0" normalizeH="0" baseline="0" noProof="0" dirty="0">
-                <a:ln>
-                  <a:noFill/>
-                </a:ln>
-                <a:solidFill>
-                  <a:prstClr val="black"/>
-                </a:solidFill>
-                <a:effectLst/>
-                <a:uLnTx/>
-                <a:uFillTx/>
-                <a:latin typeface="等线" panose="020F0502020204030204"/>
-                <a:ea typeface="等线" panose="02010600030101010101" pitchFamily="2" charset="-122"/>
-                <a:cs typeface="+mn-cs"/>
-              </a:rPr>
-              <a:t>4,194,304 = 524,288 x 8 (Remember the 8 elements stride in slide 34)</a:t>
-            </a:r>
-            <a:endParaRPr kumimoji="0" lang="zh-CN" altLang="en-US" sz="2000" b="1" i="0" u="none" strike="noStrike" kern="1200" cap="none" spc="0" normalizeH="0" baseline="0" noProof="0" dirty="0">
-              <a:ln>
-                <a:noFill/>
-              </a:ln>
-              <a:solidFill>
-                <a:prstClr val="black"/>
-              </a:solidFill>
-              <a:effectLst/>
-              <a:uLnTx/>
-              <a:uFillTx/>
-              <a:latin typeface="等线" panose="020F0502020204030204"/>
-              <a:ea typeface="等线" panose="02010600030101010101" pitchFamily="2" charset="-122"/>
-              <a:cs typeface="+mn-cs"/>
-            </a:endParaRPr>
+            <a:r>
+              <a:rPr lang="en-US" altLang="zh-CN" sz="2000" b="1" dirty="0"/>
+              <a:t>I avoid the bank conflict completely. I think this is impressive.</a:t>
+            </a:r>
+            <a:endParaRPr lang="zh-CN" altLang="en-US" sz="2000" b="1" dirty="0"/>
           </a:p>
         </p:txBody>
       </p:sp>
@@ -9987,54 +10015,11 @@
           </a:bodyPr>
           <a:lstStyle/>
           <a:p>
-            <a:pPr marL="0" marR="0" lvl="0" indent="0" algn="l" defTabSz="914400" rtl="0" eaLnBrk="1" fontAlgn="auto" latinLnBrk="0" hangingPunct="1">
-              <a:lnSpc>
-                <a:spcPct val="100000"/>
-              </a:lnSpc>
-              <a:spcBef>
-                <a:spcPts val="0"/>
-              </a:spcBef>
-              <a:spcAft>
-                <a:spcPts val="0"/>
-              </a:spcAft>
-              <a:buClrTx/>
-              <a:buSzTx/>
-              <a:buFontTx/>
-              <a:buNone/>
-              <a:tabLst/>
-              <a:defRPr/>
-            </a:pPr>
-            <a:r>
-              <a:rPr kumimoji="0" lang="en-US" altLang="zh-CN" sz="2400" b="1" i="0" u="none" strike="noStrike" kern="1200" cap="none" spc="0" normalizeH="0" baseline="0" noProof="0" dirty="0">
-                <a:ln>
-                  <a:noFill/>
-                </a:ln>
-                <a:solidFill>
-                  <a:prstClr val="black"/>
-                </a:solidFill>
-                <a:effectLst/>
-                <a:uLnTx/>
-                <a:uFillTx/>
-                <a:latin typeface="等线" panose="020F0502020204030204"/>
-                <a:ea typeface="等线" panose="02010600030101010101" pitchFamily="2" charset="-122"/>
-                <a:cs typeface="+mn-cs"/>
-              </a:rPr>
+            <a:r>
+              <a:rPr lang="en-US" altLang="zh-CN" sz="2400" b="1" dirty="0"/>
               <a:t>kernel 07</a:t>
             </a:r>
-            <a:endParaRPr kumimoji="0" lang="zh-CN" altLang="en-US" sz="2400" b="1" i="0" u="none" strike="noStrike" kern="1200" cap="none" spc="0" normalizeH="0" baseline="0" noProof="0" dirty="0">
-              <a:ln>
-                <a:noFill/>
-              </a:ln>
-              <a:solidFill>
-                <a:prstClr val="black"/>
-              </a:solidFill>
-              <a:effectLst/>
-              <a:uLnTx/>
-              <a:uFillTx/>
-              <a:latin typeface="等线" panose="020F0502020204030204"/>
-              <a:ea typeface="等线" panose="02010600030101010101" pitchFamily="2" charset="-122"/>
-              <a:cs typeface="+mn-cs"/>
-            </a:endParaRPr>
+            <a:endParaRPr lang="zh-CN" altLang="en-US" sz="2400" b="1" dirty="0"/>
           </a:p>
         </p:txBody>
       </p:sp>
@@ -10066,54 +10051,11 @@
           </a:bodyPr>
           <a:lstStyle/>
           <a:p>
-            <a:pPr marL="0" marR="0" lvl="0" indent="0" algn="l" defTabSz="914400" rtl="0" eaLnBrk="1" fontAlgn="auto" latinLnBrk="0" hangingPunct="1">
-              <a:lnSpc>
-                <a:spcPct val="100000"/>
-              </a:lnSpc>
-              <a:spcBef>
-                <a:spcPts val="0"/>
-              </a:spcBef>
-              <a:spcAft>
-                <a:spcPts val="0"/>
-              </a:spcAft>
-              <a:buClrTx/>
-              <a:buSzTx/>
-              <a:buFontTx/>
-              <a:buNone/>
-              <a:tabLst/>
-              <a:defRPr/>
-            </a:pPr>
-            <a:r>
-              <a:rPr kumimoji="0" lang="en-US" altLang="zh-CN" sz="2400" b="1" i="0" u="none" strike="noStrike" kern="1200" cap="none" spc="0" normalizeH="0" baseline="0" noProof="0" dirty="0">
-                <a:ln>
-                  <a:noFill/>
-                </a:ln>
-                <a:solidFill>
-                  <a:prstClr val="black"/>
-                </a:solidFill>
-                <a:effectLst/>
-                <a:uLnTx/>
-                <a:uFillTx/>
-                <a:latin typeface="等线" panose="020F0502020204030204"/>
-                <a:ea typeface="等线" panose="02010600030101010101" pitchFamily="2" charset="-122"/>
-                <a:cs typeface="+mn-cs"/>
-              </a:rPr>
+            <a:r>
+              <a:rPr lang="en-US" altLang="zh-CN" sz="2400" b="1" dirty="0"/>
               <a:t>kernel 08</a:t>
             </a:r>
-            <a:endParaRPr kumimoji="0" lang="zh-CN" altLang="en-US" sz="2400" b="1" i="0" u="none" strike="noStrike" kern="1200" cap="none" spc="0" normalizeH="0" baseline="0" noProof="0" dirty="0">
-              <a:ln>
-                <a:noFill/>
-              </a:ln>
-              <a:solidFill>
-                <a:prstClr val="black"/>
-              </a:solidFill>
-              <a:effectLst/>
-              <a:uLnTx/>
-              <a:uFillTx/>
-              <a:latin typeface="等线" panose="020F0502020204030204"/>
-              <a:ea typeface="等线" panose="02010600030101010101" pitchFamily="2" charset="-122"/>
-              <a:cs typeface="+mn-cs"/>
-            </a:endParaRPr>
+            <a:endParaRPr lang="zh-CN" altLang="en-US" sz="2400" b="1" dirty="0"/>
           </a:p>
         </p:txBody>
       </p:sp>
@@ -10159,82 +10101,10 @@
           </a:fontRef>
         </p:style>
       </p:cxnSp>
-      <p:sp>
-        <p:nvSpPr>
-          <p:cNvPr id="10" name="文本框 9">
-            <a:extLst>
-              <a:ext uri="{FF2B5EF4-FFF2-40B4-BE49-F238E27FC236}">
-                <a16:creationId xmlns:a16="http://schemas.microsoft.com/office/drawing/2014/main" id="{E06957A9-930E-8AEF-2EB4-441A96926A6C}"/>
-              </a:ext>
-            </a:extLst>
-          </p:cNvPr>
-          <p:cNvSpPr txBox="1"/>
-          <p:nvPr/>
-        </p:nvSpPr>
-        <p:spPr>
-          <a:xfrm>
-            <a:off x="1653310" y="2142836"/>
-            <a:ext cx="6003636" cy="461665"/>
-          </a:xfrm>
-          <a:prstGeom prst="rect">
-            <a:avLst/>
-          </a:prstGeom>
-          <a:noFill/>
-        </p:spPr>
-        <p:txBody>
-          <a:bodyPr wrap="square" rtlCol="0">
-            <a:spAutoFit/>
-          </a:bodyPr>
-          <a:lstStyle/>
-          <a:p>
-            <a:r>
-              <a:rPr lang="en-US" altLang="zh-CN" sz="2400" b="1" dirty="0"/>
-              <a:t>Number of sectors requested: 4,194,304</a:t>
-            </a:r>
-            <a:endParaRPr lang="zh-CN" altLang="en-US" sz="2400" b="1" dirty="0"/>
-          </a:p>
-        </p:txBody>
-      </p:sp>
-      <p:sp>
-        <p:nvSpPr>
-          <p:cNvPr id="12" name="文本框 11">
-            <a:extLst>
-              <a:ext uri="{FF2B5EF4-FFF2-40B4-BE49-F238E27FC236}">
-                <a16:creationId xmlns:a16="http://schemas.microsoft.com/office/drawing/2014/main" id="{59BEB065-5D8A-6FA2-F1FB-B3F170B8E40F}"/>
-              </a:ext>
-            </a:extLst>
-          </p:cNvPr>
-          <p:cNvSpPr txBox="1"/>
-          <p:nvPr/>
-        </p:nvSpPr>
-        <p:spPr>
-          <a:xfrm>
-            <a:off x="1653310" y="5085329"/>
-            <a:ext cx="6003636" cy="461665"/>
-          </a:xfrm>
-          <a:prstGeom prst="rect">
-            <a:avLst/>
-          </a:prstGeom>
-          <a:noFill/>
-        </p:spPr>
-        <p:txBody>
-          <a:bodyPr wrap="square" rtlCol="0">
-            <a:spAutoFit/>
-          </a:bodyPr>
-          <a:lstStyle/>
-          <a:p>
-            <a:r>
-              <a:rPr lang="en-US" altLang="zh-CN" sz="2400" b="1" dirty="0"/>
-              <a:t>Number of sectors requested: 524,288</a:t>
-            </a:r>
-            <a:endParaRPr lang="zh-CN" altLang="en-US" sz="2400" b="1" dirty="0"/>
-          </a:p>
-        </p:txBody>
-      </p:sp>
     </p:spTree>
     <p:extLst>
       <p:ext uri="{BB962C8B-B14F-4D97-AF65-F5344CB8AC3E}">
-        <p14:creationId xmlns:p14="http://schemas.microsoft.com/office/powerpoint/2010/main" val="1191200527"/>
+        <p14:creationId xmlns:p14="http://schemas.microsoft.com/office/powerpoint/2010/main" val="650156779"/>
       </p:ext>
     </p:extLst>
   </p:cSld>
@@ -10266,7 +10136,7 @@
           <p:cNvPr id="2" name="文本框 1">
             <a:extLst>
               <a:ext uri="{FF2B5EF4-FFF2-40B4-BE49-F238E27FC236}">
-                <a16:creationId xmlns:a16="http://schemas.microsoft.com/office/drawing/2014/main" id="{28C4963E-BDD4-DB39-42B4-4979629CF52A}"/>
+                <a16:creationId xmlns:a16="http://schemas.microsoft.com/office/drawing/2014/main" id="{7B1DCD9B-BDDD-095A-45A0-720E625F0CEA}"/>
               </a:ext>
             </a:extLst>
           </p:cNvPr>
@@ -10328,42 +10198,12 @@
           </a:p>
         </p:txBody>
       </p:sp>
-      <p:pic>
-        <p:nvPicPr>
-          <p:cNvPr id="7" name="图片 6">
-            <a:extLst>
-              <a:ext uri="{FF2B5EF4-FFF2-40B4-BE49-F238E27FC236}">
-                <a16:creationId xmlns:a16="http://schemas.microsoft.com/office/drawing/2014/main" id="{0B55F4A6-9AE6-EC66-5751-F237A1E91404}"/>
-              </a:ext>
-            </a:extLst>
-          </p:cNvPr>
-          <p:cNvPicPr>
-            <a:picLocks noChangeAspect="1"/>
-          </p:cNvPicPr>
-          <p:nvPr/>
-        </p:nvPicPr>
-        <p:blipFill>
-          <a:blip r:embed="rId2"/>
-          <a:stretch>
-            <a:fillRect/>
-          </a:stretch>
-        </p:blipFill>
-        <p:spPr>
-          <a:xfrm>
-            <a:off x="859806" y="2319940"/>
-            <a:ext cx="10289539" cy="2677278"/>
-          </a:xfrm>
-          <a:prstGeom prst="rect">
-            <a:avLst/>
-          </a:prstGeom>
-        </p:spPr>
-      </p:pic>
-      <p:sp>
-        <p:nvSpPr>
-          <p:cNvPr id="8" name="文本框 7">
-            <a:extLst>
-              <a:ext uri="{FF2B5EF4-FFF2-40B4-BE49-F238E27FC236}">
-                <a16:creationId xmlns:a16="http://schemas.microsoft.com/office/drawing/2014/main" id="{4E72B0D6-4532-BAFD-D0DC-C79A64FE9552}"/>
+      <p:sp>
+        <p:nvSpPr>
+          <p:cNvPr id="7" name="文本框 6">
+            <a:extLst>
+              <a:ext uri="{FF2B5EF4-FFF2-40B4-BE49-F238E27FC236}">
+                <a16:creationId xmlns:a16="http://schemas.microsoft.com/office/drawing/2014/main" id="{5C083ADA-12BA-DDA1-83AC-EB942ED434A9}"/>
               </a:ext>
             </a:extLst>
           </p:cNvPr>
@@ -10372,8 +10212,8 @@
         </p:nvSpPr>
         <p:spPr>
           <a:xfrm>
-            <a:off x="914401" y="1313299"/>
-            <a:ext cx="3946034" cy="400110"/>
+            <a:off x="1089891" y="3428627"/>
+            <a:ext cx="8198217" cy="707886"/>
           </a:xfrm>
           <a:prstGeom prst="rect">
             <a:avLst/>
@@ -10386,18 +10226,369 @@
           </a:bodyPr>
           <a:lstStyle/>
           <a:p>
-            <a:r>
-              <a:rPr lang="en-US" altLang="zh-CN" sz="2000" b="1" dirty="0"/>
-              <a:t>As cutlass document said:</a:t>
-            </a:r>
-            <a:endParaRPr lang="zh-CN" altLang="en-US" sz="2000" b="1" dirty="0"/>
+            <a:pPr marL="0" marR="0" lvl="0" indent="0" algn="l" defTabSz="914400" rtl="0" eaLnBrk="1" fontAlgn="auto" latinLnBrk="0" hangingPunct="1">
+              <a:lnSpc>
+                <a:spcPct val="100000"/>
+              </a:lnSpc>
+              <a:spcBef>
+                <a:spcPts val="0"/>
+              </a:spcBef>
+              <a:spcAft>
+                <a:spcPts val="0"/>
+              </a:spcAft>
+              <a:buClrTx/>
+              <a:buSzTx/>
+              <a:buFontTx/>
+              <a:buNone/>
+              <a:tabLst/>
+              <a:defRPr/>
+            </a:pPr>
+            <a:r>
+              <a:rPr kumimoji="0" lang="en-US" altLang="zh-CN" sz="2000" b="1" i="0" u="none" strike="noStrike" kern="1200" cap="none" spc="0" normalizeH="0" baseline="0" noProof="0" dirty="0">
+                <a:ln>
+                  <a:noFill/>
+                </a:ln>
+                <a:solidFill>
+                  <a:prstClr val="black"/>
+                </a:solidFill>
+                <a:effectLst/>
+                <a:uLnTx/>
+                <a:uFillTx/>
+                <a:latin typeface="等线" panose="020F0502020204030204"/>
+                <a:ea typeface="等线" panose="02010600030101010101" pitchFamily="2" charset="-122"/>
+                <a:cs typeface="+mn-cs"/>
+              </a:rPr>
+              <a:t>I optimized the global store pattern:</a:t>
+            </a:r>
+          </a:p>
+          <a:p>
+            <a:pPr marL="0" marR="0" lvl="0" indent="0" algn="l" defTabSz="914400" rtl="0" eaLnBrk="1" fontAlgn="auto" latinLnBrk="0" hangingPunct="1">
+              <a:lnSpc>
+                <a:spcPct val="100000"/>
+              </a:lnSpc>
+              <a:spcBef>
+                <a:spcPts val="0"/>
+              </a:spcBef>
+              <a:spcAft>
+                <a:spcPts val="0"/>
+              </a:spcAft>
+              <a:buClrTx/>
+              <a:buSzTx/>
+              <a:buFontTx/>
+              <a:buNone/>
+              <a:tabLst/>
+              <a:defRPr/>
+            </a:pPr>
+            <a:r>
+              <a:rPr kumimoji="0" lang="en-US" altLang="zh-CN" sz="2000" b="1" i="0" u="none" strike="noStrike" kern="1200" cap="none" spc="0" normalizeH="0" baseline="0" noProof="0" dirty="0">
+                <a:ln>
+                  <a:noFill/>
+                </a:ln>
+                <a:solidFill>
+                  <a:prstClr val="black"/>
+                </a:solidFill>
+                <a:effectLst/>
+                <a:uLnTx/>
+                <a:uFillTx/>
+                <a:latin typeface="等线" panose="020F0502020204030204"/>
+                <a:ea typeface="等线" panose="02010600030101010101" pitchFamily="2" charset="-122"/>
+                <a:cs typeface="+mn-cs"/>
+              </a:rPr>
+              <a:t>4,194,304 = 524,288 x 8 (Remember the 8 elements stride in slide 34)</a:t>
+            </a:r>
+            <a:endParaRPr kumimoji="0" lang="zh-CN" altLang="en-US" sz="2000" b="1" i="0" u="none" strike="noStrike" kern="1200" cap="none" spc="0" normalizeH="0" baseline="0" noProof="0" dirty="0">
+              <a:ln>
+                <a:noFill/>
+              </a:ln>
+              <a:solidFill>
+                <a:prstClr val="black"/>
+              </a:solidFill>
+              <a:effectLst/>
+              <a:uLnTx/>
+              <a:uFillTx/>
+              <a:latin typeface="等线" panose="020F0502020204030204"/>
+              <a:ea typeface="等线" panose="02010600030101010101" pitchFamily="2" charset="-122"/>
+              <a:cs typeface="+mn-cs"/>
+            </a:endParaRPr>
+          </a:p>
+        </p:txBody>
+      </p:sp>
+      <p:sp>
+        <p:nvSpPr>
+          <p:cNvPr id="8" name="文本框 7">
+            <a:extLst>
+              <a:ext uri="{FF2B5EF4-FFF2-40B4-BE49-F238E27FC236}">
+                <a16:creationId xmlns:a16="http://schemas.microsoft.com/office/drawing/2014/main" id="{9264583E-4B69-A90C-F7A0-0EFB1BD0083A}"/>
+              </a:ext>
+            </a:extLst>
+          </p:cNvPr>
+          <p:cNvSpPr txBox="1"/>
+          <p:nvPr/>
+        </p:nvSpPr>
+        <p:spPr>
+          <a:xfrm>
+            <a:off x="10086109" y="1985818"/>
+            <a:ext cx="1707782" cy="461665"/>
+          </a:xfrm>
+          <a:prstGeom prst="rect">
+            <a:avLst/>
+          </a:prstGeom>
+          <a:noFill/>
+        </p:spPr>
+        <p:txBody>
+          <a:bodyPr wrap="square" rtlCol="0">
+            <a:spAutoFit/>
+          </a:bodyPr>
+          <a:lstStyle/>
+          <a:p>
+            <a:pPr marL="0" marR="0" lvl="0" indent="0" algn="l" defTabSz="914400" rtl="0" eaLnBrk="1" fontAlgn="auto" latinLnBrk="0" hangingPunct="1">
+              <a:lnSpc>
+                <a:spcPct val="100000"/>
+              </a:lnSpc>
+              <a:spcBef>
+                <a:spcPts val="0"/>
+              </a:spcBef>
+              <a:spcAft>
+                <a:spcPts val="0"/>
+              </a:spcAft>
+              <a:buClrTx/>
+              <a:buSzTx/>
+              <a:buFontTx/>
+              <a:buNone/>
+              <a:tabLst/>
+              <a:defRPr/>
+            </a:pPr>
+            <a:r>
+              <a:rPr kumimoji="0" lang="en-US" altLang="zh-CN" sz="2400" b="1" i="0" u="none" strike="noStrike" kern="1200" cap="none" spc="0" normalizeH="0" baseline="0" noProof="0" dirty="0">
+                <a:ln>
+                  <a:noFill/>
+                </a:ln>
+                <a:solidFill>
+                  <a:prstClr val="black"/>
+                </a:solidFill>
+                <a:effectLst/>
+                <a:uLnTx/>
+                <a:uFillTx/>
+                <a:latin typeface="等线" panose="020F0502020204030204"/>
+                <a:ea typeface="等线" panose="02010600030101010101" pitchFamily="2" charset="-122"/>
+                <a:cs typeface="+mn-cs"/>
+              </a:rPr>
+              <a:t>kernel 07</a:t>
+            </a:r>
+            <a:endParaRPr kumimoji="0" lang="zh-CN" altLang="en-US" sz="2400" b="1" i="0" u="none" strike="noStrike" kern="1200" cap="none" spc="0" normalizeH="0" baseline="0" noProof="0" dirty="0">
+              <a:ln>
+                <a:noFill/>
+              </a:ln>
+              <a:solidFill>
+                <a:prstClr val="black"/>
+              </a:solidFill>
+              <a:effectLst/>
+              <a:uLnTx/>
+              <a:uFillTx/>
+              <a:latin typeface="等线" panose="020F0502020204030204"/>
+              <a:ea typeface="等线" panose="02010600030101010101" pitchFamily="2" charset="-122"/>
+              <a:cs typeface="+mn-cs"/>
+            </a:endParaRPr>
+          </a:p>
+        </p:txBody>
+      </p:sp>
+      <p:sp>
+        <p:nvSpPr>
+          <p:cNvPr id="9" name="文本框 8">
+            <a:extLst>
+              <a:ext uri="{FF2B5EF4-FFF2-40B4-BE49-F238E27FC236}">
+                <a16:creationId xmlns:a16="http://schemas.microsoft.com/office/drawing/2014/main" id="{21FCE974-32F5-B0B2-AEBF-F545ED7628ED}"/>
+              </a:ext>
+            </a:extLst>
+          </p:cNvPr>
+          <p:cNvSpPr txBox="1"/>
+          <p:nvPr/>
+        </p:nvSpPr>
+        <p:spPr>
+          <a:xfrm>
+            <a:off x="10002982" y="5085329"/>
+            <a:ext cx="1707782" cy="461665"/>
+          </a:xfrm>
+          <a:prstGeom prst="rect">
+            <a:avLst/>
+          </a:prstGeom>
+          <a:noFill/>
+        </p:spPr>
+        <p:txBody>
+          <a:bodyPr wrap="square" rtlCol="0">
+            <a:spAutoFit/>
+          </a:bodyPr>
+          <a:lstStyle/>
+          <a:p>
+            <a:pPr marL="0" marR="0" lvl="0" indent="0" algn="l" defTabSz="914400" rtl="0" eaLnBrk="1" fontAlgn="auto" latinLnBrk="0" hangingPunct="1">
+              <a:lnSpc>
+                <a:spcPct val="100000"/>
+              </a:lnSpc>
+              <a:spcBef>
+                <a:spcPts val="0"/>
+              </a:spcBef>
+              <a:spcAft>
+                <a:spcPts val="0"/>
+              </a:spcAft>
+              <a:buClrTx/>
+              <a:buSzTx/>
+              <a:buFontTx/>
+              <a:buNone/>
+              <a:tabLst/>
+              <a:defRPr/>
+            </a:pPr>
+            <a:r>
+              <a:rPr kumimoji="0" lang="en-US" altLang="zh-CN" sz="2400" b="1" i="0" u="none" strike="noStrike" kern="1200" cap="none" spc="0" normalizeH="0" baseline="0" noProof="0" dirty="0">
+                <a:ln>
+                  <a:noFill/>
+                </a:ln>
+                <a:solidFill>
+                  <a:prstClr val="black"/>
+                </a:solidFill>
+                <a:effectLst/>
+                <a:uLnTx/>
+                <a:uFillTx/>
+                <a:latin typeface="等线" panose="020F0502020204030204"/>
+                <a:ea typeface="等线" panose="02010600030101010101" pitchFamily="2" charset="-122"/>
+                <a:cs typeface="+mn-cs"/>
+              </a:rPr>
+              <a:t>kernel 08</a:t>
+            </a:r>
+            <a:endParaRPr kumimoji="0" lang="zh-CN" altLang="en-US" sz="2400" b="1" i="0" u="none" strike="noStrike" kern="1200" cap="none" spc="0" normalizeH="0" baseline="0" noProof="0" dirty="0">
+              <a:ln>
+                <a:noFill/>
+              </a:ln>
+              <a:solidFill>
+                <a:prstClr val="black"/>
+              </a:solidFill>
+              <a:effectLst/>
+              <a:uLnTx/>
+              <a:uFillTx/>
+              <a:latin typeface="等线" panose="020F0502020204030204"/>
+              <a:ea typeface="等线" panose="02010600030101010101" pitchFamily="2" charset="-122"/>
+              <a:cs typeface="+mn-cs"/>
+            </a:endParaRPr>
+          </a:p>
+        </p:txBody>
+      </p:sp>
+      <p:cxnSp>
+        <p:nvCxnSpPr>
+          <p:cNvPr id="11" name="直接箭头连接符 10">
+            <a:extLst>
+              <a:ext uri="{FF2B5EF4-FFF2-40B4-BE49-F238E27FC236}">
+                <a16:creationId xmlns:a16="http://schemas.microsoft.com/office/drawing/2014/main" id="{838F1A32-EFF9-8C0C-04E4-E699FC524773}"/>
+              </a:ext>
+            </a:extLst>
+          </p:cNvPr>
+          <p:cNvCxnSpPr/>
+          <p:nvPr/>
+        </p:nvCxnSpPr>
+        <p:spPr>
+          <a:xfrm>
+            <a:off x="10695709" y="2900218"/>
+            <a:ext cx="0" cy="1995055"/>
+          </a:xfrm>
+          <a:prstGeom prst="straightConnector1">
+            <a:avLst/>
+          </a:prstGeom>
+          <a:ln w="57150">
+            <a:solidFill>
+              <a:schemeClr val="tx1"/>
+            </a:solidFill>
+            <a:tailEnd type="triangle"/>
+          </a:ln>
+        </p:spPr>
+        <p:style>
+          <a:lnRef idx="1">
+            <a:schemeClr val="accent1"/>
+          </a:lnRef>
+          <a:fillRef idx="0">
+            <a:schemeClr val="accent1"/>
+          </a:fillRef>
+          <a:effectRef idx="0">
+            <a:schemeClr val="accent1"/>
+          </a:effectRef>
+          <a:fontRef idx="minor">
+            <a:schemeClr val="tx1"/>
+          </a:fontRef>
+        </p:style>
+      </p:cxnSp>
+      <p:sp>
+        <p:nvSpPr>
+          <p:cNvPr id="10" name="文本框 9">
+            <a:extLst>
+              <a:ext uri="{FF2B5EF4-FFF2-40B4-BE49-F238E27FC236}">
+                <a16:creationId xmlns:a16="http://schemas.microsoft.com/office/drawing/2014/main" id="{E06957A9-930E-8AEF-2EB4-441A96926A6C}"/>
+              </a:ext>
+            </a:extLst>
+          </p:cNvPr>
+          <p:cNvSpPr txBox="1"/>
+          <p:nvPr/>
+        </p:nvSpPr>
+        <p:spPr>
+          <a:xfrm>
+            <a:off x="1653310" y="2142836"/>
+            <a:ext cx="6003636" cy="461665"/>
+          </a:xfrm>
+          <a:prstGeom prst="rect">
+            <a:avLst/>
+          </a:prstGeom>
+          <a:noFill/>
+        </p:spPr>
+        <p:txBody>
+          <a:bodyPr wrap="square" rtlCol="0">
+            <a:spAutoFit/>
+          </a:bodyPr>
+          <a:lstStyle/>
+          <a:p>
+            <a:r>
+              <a:rPr lang="en-US" altLang="zh-CN" sz="2400" b="1" dirty="0"/>
+              <a:t>Number of sectors requested: 4,194,304</a:t>
+            </a:r>
+            <a:endParaRPr lang="zh-CN" altLang="en-US" sz="2400" b="1" dirty="0"/>
+          </a:p>
+        </p:txBody>
+      </p:sp>
+      <p:sp>
+        <p:nvSpPr>
+          <p:cNvPr id="12" name="文本框 11">
+            <a:extLst>
+              <a:ext uri="{FF2B5EF4-FFF2-40B4-BE49-F238E27FC236}">
+                <a16:creationId xmlns:a16="http://schemas.microsoft.com/office/drawing/2014/main" id="{59BEB065-5D8A-6FA2-F1FB-B3F170B8E40F}"/>
+              </a:ext>
+            </a:extLst>
+          </p:cNvPr>
+          <p:cNvSpPr txBox="1"/>
+          <p:nvPr/>
+        </p:nvSpPr>
+        <p:spPr>
+          <a:xfrm>
+            <a:off x="1653310" y="5085329"/>
+            <a:ext cx="6003636" cy="461665"/>
+          </a:xfrm>
+          <a:prstGeom prst="rect">
+            <a:avLst/>
+          </a:prstGeom>
+          <a:noFill/>
+        </p:spPr>
+        <p:txBody>
+          <a:bodyPr wrap="square" rtlCol="0">
+            <a:spAutoFit/>
+          </a:bodyPr>
+          <a:lstStyle/>
+          <a:p>
+            <a:r>
+              <a:rPr lang="en-US" altLang="zh-CN" sz="2400" b="1" dirty="0"/>
+              <a:t>Number of sectors requested: 524,288</a:t>
+            </a:r>
+            <a:endParaRPr lang="zh-CN" altLang="en-US" sz="2400" b="1" dirty="0"/>
           </a:p>
         </p:txBody>
       </p:sp>
     </p:spTree>
     <p:extLst>
       <p:ext uri="{BB962C8B-B14F-4D97-AF65-F5344CB8AC3E}">
-        <p14:creationId xmlns:p14="http://schemas.microsoft.com/office/powerpoint/2010/main" val="835114469"/>
+        <p14:creationId xmlns:p14="http://schemas.microsoft.com/office/powerpoint/2010/main" val="1191200527"/>
       </p:ext>
     </p:extLst>
   </p:cSld>
@@ -10429,92 +10620,7 @@
           <p:cNvPr id="2" name="文本框 1">
             <a:extLst>
               <a:ext uri="{FF2B5EF4-FFF2-40B4-BE49-F238E27FC236}">
-                <a16:creationId xmlns:a16="http://schemas.microsoft.com/office/drawing/2014/main" id="{A96DDCC3-E34A-7B9B-FD27-64FAC20C270B}"/>
-              </a:ext>
-            </a:extLst>
-          </p:cNvPr>
-          <p:cNvSpPr txBox="1"/>
-          <p:nvPr/>
-        </p:nvSpPr>
-        <p:spPr>
-          <a:xfrm>
-            <a:off x="765066" y="1665980"/>
-            <a:ext cx="10545263" cy="3170099"/>
-          </a:xfrm>
-          <a:prstGeom prst="rect">
-            <a:avLst/>
-          </a:prstGeom>
-          <a:noFill/>
-        </p:spPr>
-        <p:txBody>
-          <a:bodyPr wrap="square" rtlCol="0">
-            <a:spAutoFit/>
-          </a:bodyPr>
-          <a:lstStyle/>
-          <a:p>
-            <a:pPr algn="just"/>
-            <a:r>
-              <a:rPr lang="en-US" altLang="zh-CN" sz="2000" b="1" dirty="0"/>
-              <a:t>Data transfers from global memory to shared memory have significantly higher latency compared to arithmetic operations. </a:t>
-            </a:r>
-          </a:p>
-          <a:p>
-            <a:pPr algn="just"/>
-            <a:endParaRPr lang="en-US" altLang="zh-CN" sz="2000" b="1" dirty="0"/>
-          </a:p>
-          <a:p>
-            <a:pPr algn="just"/>
-            <a:r>
-              <a:rPr lang="en-US" altLang="zh-CN" sz="2000" b="1" dirty="0"/>
-              <a:t>During this time, threads are forced to stall, idly waiting for the data needed to compute TILE_A * TILE_B. </a:t>
-            </a:r>
-          </a:p>
-          <a:p>
-            <a:pPr algn="just"/>
-            <a:endParaRPr lang="en-US" altLang="zh-CN" sz="2000" b="1" dirty="0"/>
-          </a:p>
-          <a:p>
-            <a:pPr algn="just"/>
-            <a:r>
-              <a:rPr lang="en-US" altLang="zh-CN" sz="2000" b="1" dirty="0"/>
-              <a:t>One way to mitigate this latency is by overlapping data transfers(</a:t>
-            </a:r>
-            <a:r>
-              <a:rPr lang="en-US" altLang="zh-CN" sz="2000" b="1" dirty="0" err="1"/>
-              <a:t>ld</a:t>
-            </a:r>
-            <a:r>
-              <a:rPr lang="en-US" altLang="zh-CN" sz="2000" b="1" dirty="0"/>
-              <a:t> instruction) with computations(</a:t>
-            </a:r>
-            <a:r>
-              <a:rPr lang="en-US" altLang="zh-CN" sz="2000" b="1" dirty="0" err="1"/>
-              <a:t>fma</a:t>
-            </a:r>
-            <a:r>
-              <a:rPr lang="en-US" altLang="zh-CN" sz="2000" b="1" dirty="0"/>
-              <a:t> instruction), leveraging instruction-level parallelism. </a:t>
-            </a:r>
-          </a:p>
-          <a:p>
-            <a:pPr algn="just"/>
-            <a:endParaRPr lang="en-US" altLang="zh-CN" sz="2000" b="1" dirty="0"/>
-          </a:p>
-          <a:p>
-            <a:pPr algn="just"/>
-            <a:r>
-              <a:rPr lang="en-US" altLang="zh-CN" sz="2000" b="1" dirty="0"/>
-              <a:t>The pseudo code is as follows:</a:t>
-            </a:r>
-          </a:p>
-        </p:txBody>
-      </p:sp>
-      <p:sp>
-        <p:nvSpPr>
-          <p:cNvPr id="3" name="文本框 2">
-            <a:extLst>
-              <a:ext uri="{FF2B5EF4-FFF2-40B4-BE49-F238E27FC236}">
-                <a16:creationId xmlns:a16="http://schemas.microsoft.com/office/drawing/2014/main" id="{7F39B435-E99E-A65B-821B-17A69B505E21}"/>
+                <a16:creationId xmlns:a16="http://schemas.microsoft.com/office/drawing/2014/main" id="{28C4963E-BDD4-DB39-42B4-4979629CF52A}"/>
               </a:ext>
             </a:extLst>
           </p:cNvPr>
@@ -10576,10 +10682,76 @@
           </a:p>
         </p:txBody>
       </p:sp>
+      <p:pic>
+        <p:nvPicPr>
+          <p:cNvPr id="7" name="图片 6">
+            <a:extLst>
+              <a:ext uri="{FF2B5EF4-FFF2-40B4-BE49-F238E27FC236}">
+                <a16:creationId xmlns:a16="http://schemas.microsoft.com/office/drawing/2014/main" id="{0B55F4A6-9AE6-EC66-5751-F237A1E91404}"/>
+              </a:ext>
+            </a:extLst>
+          </p:cNvPr>
+          <p:cNvPicPr>
+            <a:picLocks noChangeAspect="1"/>
+          </p:cNvPicPr>
+          <p:nvPr/>
+        </p:nvPicPr>
+        <p:blipFill>
+          <a:blip r:embed="rId2"/>
+          <a:stretch>
+            <a:fillRect/>
+          </a:stretch>
+        </p:blipFill>
+        <p:spPr>
+          <a:xfrm>
+            <a:off x="859806" y="2319940"/>
+            <a:ext cx="10289539" cy="2677278"/>
+          </a:xfrm>
+          <a:prstGeom prst="rect">
+            <a:avLst/>
+          </a:prstGeom>
+        </p:spPr>
+      </p:pic>
+      <p:sp>
+        <p:nvSpPr>
+          <p:cNvPr id="8" name="文本框 7">
+            <a:extLst>
+              <a:ext uri="{FF2B5EF4-FFF2-40B4-BE49-F238E27FC236}">
+                <a16:creationId xmlns:a16="http://schemas.microsoft.com/office/drawing/2014/main" id="{4E72B0D6-4532-BAFD-D0DC-C79A64FE9552}"/>
+              </a:ext>
+            </a:extLst>
+          </p:cNvPr>
+          <p:cNvSpPr txBox="1"/>
+          <p:nvPr/>
+        </p:nvSpPr>
+        <p:spPr>
+          <a:xfrm>
+            <a:off x="914401" y="1313299"/>
+            <a:ext cx="3946034" cy="400110"/>
+          </a:xfrm>
+          <a:prstGeom prst="rect">
+            <a:avLst/>
+          </a:prstGeom>
+          <a:noFill/>
+        </p:spPr>
+        <p:txBody>
+          <a:bodyPr wrap="square" rtlCol="0">
+            <a:spAutoFit/>
+          </a:bodyPr>
+          <a:lstStyle/>
+          <a:p>
+            <a:r>
+              <a:rPr lang="en-US" altLang="zh-CN" sz="2000" b="1" dirty="0"/>
+              <a:t>As cutlass document said:</a:t>
+            </a:r>
+            <a:endParaRPr lang="zh-CN" altLang="en-US" sz="2000" b="1" dirty="0"/>
+          </a:p>
+        </p:txBody>
+      </p:sp>
     </p:spTree>
     <p:extLst>
       <p:ext uri="{BB962C8B-B14F-4D97-AF65-F5344CB8AC3E}">
-        <p14:creationId xmlns:p14="http://schemas.microsoft.com/office/powerpoint/2010/main" val="2544584525"/>
+        <p14:creationId xmlns:p14="http://schemas.microsoft.com/office/powerpoint/2010/main" val="835114469"/>
       </p:ext>
     </p:extLst>
   </p:cSld>
@@ -10608,10 +10780,10 @@
       </p:grpSpPr>
       <p:sp>
         <p:nvSpPr>
-          <p:cNvPr id="5" name="文本框 4">
-            <a:extLst>
-              <a:ext uri="{FF2B5EF4-FFF2-40B4-BE49-F238E27FC236}">
-                <a16:creationId xmlns:a16="http://schemas.microsoft.com/office/drawing/2014/main" id="{DAB9FFA6-B7DE-8B48-D7C6-15C95E9B2BBA}"/>
+          <p:cNvPr id="2" name="文本框 1">
+            <a:extLst>
+              <a:ext uri="{FF2B5EF4-FFF2-40B4-BE49-F238E27FC236}">
+                <a16:creationId xmlns:a16="http://schemas.microsoft.com/office/drawing/2014/main" id="{A96DDCC3-E34A-7B9B-FD27-64FAC20C270B}"/>
               </a:ext>
             </a:extLst>
           </p:cNvPr>
@@ -10620,8 +10792,93 @@
         </p:nvSpPr>
         <p:spPr>
           <a:xfrm>
-            <a:off x="188710" y="345294"/>
-            <a:ext cx="8360009" cy="523220"/>
+            <a:off x="765066" y="1665980"/>
+            <a:ext cx="10545263" cy="3170099"/>
+          </a:xfrm>
+          <a:prstGeom prst="rect">
+            <a:avLst/>
+          </a:prstGeom>
+          <a:noFill/>
+        </p:spPr>
+        <p:txBody>
+          <a:bodyPr wrap="square" rtlCol="0">
+            <a:spAutoFit/>
+          </a:bodyPr>
+          <a:lstStyle/>
+          <a:p>
+            <a:pPr algn="just"/>
+            <a:r>
+              <a:rPr lang="en-US" altLang="zh-CN" sz="2000" b="1" dirty="0"/>
+              <a:t>Data transfers from global memory to shared memory have significantly higher latency compared to arithmetic operations. </a:t>
+            </a:r>
+          </a:p>
+          <a:p>
+            <a:pPr algn="just"/>
+            <a:endParaRPr lang="en-US" altLang="zh-CN" sz="2000" b="1" dirty="0"/>
+          </a:p>
+          <a:p>
+            <a:pPr algn="just"/>
+            <a:r>
+              <a:rPr lang="en-US" altLang="zh-CN" sz="2000" b="1" dirty="0"/>
+              <a:t>During this time, threads are forced to stall, idly waiting for the data needed to compute TILE_A * TILE_B. </a:t>
+            </a:r>
+          </a:p>
+          <a:p>
+            <a:pPr algn="just"/>
+            <a:endParaRPr lang="en-US" altLang="zh-CN" sz="2000" b="1" dirty="0"/>
+          </a:p>
+          <a:p>
+            <a:pPr algn="just"/>
+            <a:r>
+              <a:rPr lang="en-US" altLang="zh-CN" sz="2000" b="1" dirty="0"/>
+              <a:t>One way to mitigate this latency is by overlapping data transfers(</a:t>
+            </a:r>
+            <a:r>
+              <a:rPr lang="en-US" altLang="zh-CN" sz="2000" b="1" dirty="0" err="1"/>
+              <a:t>ld</a:t>
+            </a:r>
+            <a:r>
+              <a:rPr lang="en-US" altLang="zh-CN" sz="2000" b="1" dirty="0"/>
+              <a:t> instruction) with computations(</a:t>
+            </a:r>
+            <a:r>
+              <a:rPr lang="en-US" altLang="zh-CN" sz="2000" b="1" dirty="0" err="1"/>
+              <a:t>fma</a:t>
+            </a:r>
+            <a:r>
+              <a:rPr lang="en-US" altLang="zh-CN" sz="2000" b="1" dirty="0"/>
+              <a:t> instruction), leveraging instruction-level parallelism. </a:t>
+            </a:r>
+          </a:p>
+          <a:p>
+            <a:pPr algn="just"/>
+            <a:endParaRPr lang="en-US" altLang="zh-CN" sz="2000" b="1" dirty="0"/>
+          </a:p>
+          <a:p>
+            <a:pPr algn="just"/>
+            <a:r>
+              <a:rPr lang="en-US" altLang="zh-CN" sz="2000" b="1" dirty="0"/>
+              <a:t>The pseudo code is as follows:</a:t>
+            </a:r>
+          </a:p>
+        </p:txBody>
+      </p:sp>
+      <p:sp>
+        <p:nvSpPr>
+          <p:cNvPr id="3" name="文本框 2">
+            <a:extLst>
+              <a:ext uri="{FF2B5EF4-FFF2-40B4-BE49-F238E27FC236}">
+                <a16:creationId xmlns:a16="http://schemas.microsoft.com/office/drawing/2014/main" id="{7F39B435-E99E-A65B-821B-17A69B505E21}"/>
+              </a:ext>
+            </a:extLst>
+          </p:cNvPr>
+          <p:cNvSpPr txBox="1"/>
+          <p:nvPr/>
+        </p:nvSpPr>
+        <p:spPr>
+          <a:xfrm>
+            <a:off x="176436" y="183548"/>
+            <a:ext cx="7678813" cy="523220"/>
           </a:xfrm>
           <a:prstGeom prst="rect">
             <a:avLst/>
@@ -10673,40 +10930,10 @@
           </a:p>
         </p:txBody>
       </p:sp>
-      <p:pic>
-        <p:nvPicPr>
-          <p:cNvPr id="9" name="图片 8">
-            <a:extLst>
-              <a:ext uri="{FF2B5EF4-FFF2-40B4-BE49-F238E27FC236}">
-                <a16:creationId xmlns:a16="http://schemas.microsoft.com/office/drawing/2014/main" id="{0B12A95F-4BC2-1D51-439F-9252687C9111}"/>
-              </a:ext>
-            </a:extLst>
-          </p:cNvPr>
-          <p:cNvPicPr>
-            <a:picLocks noChangeAspect="1"/>
-          </p:cNvPicPr>
-          <p:nvPr/>
-        </p:nvPicPr>
-        <p:blipFill>
-          <a:blip r:embed="rId2"/>
-          <a:stretch>
-            <a:fillRect/>
-          </a:stretch>
-        </p:blipFill>
-        <p:spPr>
-          <a:xfrm>
-            <a:off x="2828571" y="1337509"/>
-            <a:ext cx="5982535" cy="4391638"/>
-          </a:xfrm>
-          <a:prstGeom prst="rect">
-            <a:avLst/>
-          </a:prstGeom>
-        </p:spPr>
-      </p:pic>
     </p:spTree>
     <p:extLst>
       <p:ext uri="{BB962C8B-B14F-4D97-AF65-F5344CB8AC3E}">
-        <p14:creationId xmlns:p14="http://schemas.microsoft.com/office/powerpoint/2010/main" val="1462063294"/>
+        <p14:creationId xmlns:p14="http://schemas.microsoft.com/office/powerpoint/2010/main" val="2544584525"/>
       </p:ext>
     </p:extLst>
   </p:cSld>
@@ -10735,10 +10962,10 @@
       </p:grpSpPr>
       <p:sp>
         <p:nvSpPr>
-          <p:cNvPr id="2" name="文本框 1">
-            <a:extLst>
-              <a:ext uri="{FF2B5EF4-FFF2-40B4-BE49-F238E27FC236}">
-                <a16:creationId xmlns:a16="http://schemas.microsoft.com/office/drawing/2014/main" id="{5C20ADEE-FF9D-CE49-8F9A-775C360AE867}"/>
+          <p:cNvPr id="5" name="文本框 4">
+            <a:extLst>
+              <a:ext uri="{FF2B5EF4-FFF2-40B4-BE49-F238E27FC236}">
+                <a16:creationId xmlns:a16="http://schemas.microsoft.com/office/drawing/2014/main" id="{DAB9FFA6-B7DE-8B48-D7C6-15C95E9B2BBA}"/>
               </a:ext>
             </a:extLst>
           </p:cNvPr>
@@ -10747,8 +10974,8 @@
         </p:nvSpPr>
         <p:spPr>
           <a:xfrm>
-            <a:off x="335996" y="127758"/>
-            <a:ext cx="4389427" cy="584775"/>
+            <a:off x="188710" y="345294"/>
+            <a:ext cx="8360009" cy="523220"/>
           </a:xfrm>
           <a:prstGeom prst="rect">
             <a:avLst/>
@@ -10761,7 +10988,7 @@
           </a:bodyPr>
           <a:lstStyle/>
           <a:p>
-            <a:pPr marR="0" lvl="0" algn="l" defTabSz="914400" rtl="0" eaLnBrk="1" fontAlgn="auto" latinLnBrk="0" hangingPunct="1">
+            <a:pPr marL="0" marR="0" lvl="0" indent="0" algn="l" defTabSz="914400" rtl="0" eaLnBrk="1" fontAlgn="auto" latinLnBrk="0" hangingPunct="1">
               <a:lnSpc>
                 <a:spcPct val="100000"/>
               </a:lnSpc>
@@ -10773,18 +11000,19 @@
               </a:spcAft>
               <a:buClrTx/>
               <a:buSzTx/>
+              <a:buFontTx/>
+              <a:buNone/>
               <a:tabLst/>
               <a:defRPr/>
             </a:pPr>
             <a:r>
-              <a:rPr kumimoji="0" lang="en-US" altLang="zh-CN" sz="3200" b="1" i="0" u="none" strike="noStrike" kern="1200" cap="none" spc="0" normalizeH="0" baseline="0" noProof="0" dirty="0">
+              <a:rPr kumimoji="0" lang="en-US" altLang="zh-CN" sz="2800" b="1" i="0" u="none" strike="noStrike" kern="1200" cap="none" spc="0" normalizeH="0" baseline="0" noProof="0" dirty="0">
                 <a:ln>
                   <a:noFill/>
                 </a:ln>
                 <a:solidFill>
-                  <a:srgbClr val="ED7D31">
-                    <a:lumMod val="60000"/>
-                    <a:lumOff val="40000"/>
+                  <a:srgbClr val="70AD47">
+                    <a:lumMod val="75000"/>
                   </a:srgbClr>
                 </a:solidFill>
                 <a:effectLst/>
@@ -10794,132 +11022,45 @@
                 <a:ea typeface="等线" panose="02010600030101010101" pitchFamily="2" charset="-122"/>
                 <a:cs typeface="+mn-cs"/>
               </a:rPr>
-              <a:t>Confusion and</a:t>
-            </a:r>
-            <a:r>
-              <a:rPr lang="zh-CN" altLang="en-US" sz="3200" b="1" dirty="0">
-                <a:solidFill>
-                  <a:srgbClr val="ED7D31">
-                    <a:lumMod val="60000"/>
-                    <a:lumOff val="40000"/>
-                  </a:srgbClr>
-                </a:solidFill>
-                <a:latin typeface="等线" panose="020F0502020204030204"/>
-                <a:ea typeface="等线" panose="02010600030101010101" pitchFamily="2" charset="-122"/>
-              </a:rPr>
-              <a:t> </a:t>
-            </a:r>
-            <a:r>
-              <a:rPr lang="en-US" altLang="zh-CN" sz="3200" b="1" dirty="0">
-                <a:solidFill>
-                  <a:srgbClr val="ED7D31">
-                    <a:lumMod val="60000"/>
-                    <a:lumOff val="40000"/>
-                  </a:srgbClr>
-                </a:solidFill>
-                <a:latin typeface="等线" panose="020F0502020204030204"/>
-                <a:ea typeface="等线" panose="02010600030101010101" pitchFamily="2" charset="-122"/>
-              </a:rPr>
-              <a:t>TODO</a:t>
-            </a:r>
-            <a:endParaRPr kumimoji="0" lang="en-US" altLang="zh-CN" sz="3200" b="1" i="0" u="none" strike="noStrike" kern="1200" cap="none" spc="0" normalizeH="0" baseline="0" noProof="0" dirty="0">
-              <a:ln>
-                <a:noFill/>
-              </a:ln>
-              <a:solidFill>
-                <a:srgbClr val="ED7D31">
-                  <a:lumMod val="60000"/>
-                  <a:lumOff val="40000"/>
-                </a:srgbClr>
-              </a:solidFill>
-              <a:effectLst/>
-              <a:uLnTx/>
-              <a:uFillTx/>
-              <a:latin typeface="等线" panose="020F0502020204030204"/>
-              <a:ea typeface="等线" panose="02010600030101010101" pitchFamily="2" charset="-122"/>
-              <a:cs typeface="+mn-cs"/>
-            </a:endParaRPr>
-          </a:p>
-        </p:txBody>
-      </p:sp>
-      <p:sp>
-        <p:nvSpPr>
-          <p:cNvPr id="6" name="文本框 5">
-            <a:extLst>
-              <a:ext uri="{FF2B5EF4-FFF2-40B4-BE49-F238E27FC236}">
-                <a16:creationId xmlns:a16="http://schemas.microsoft.com/office/drawing/2014/main" id="{45E110C7-0CC5-0F7A-776C-6C4A2921D05E}"/>
-              </a:ext>
-            </a:extLst>
-          </p:cNvPr>
-          <p:cNvSpPr txBox="1"/>
-          <p:nvPr/>
-        </p:nvSpPr>
-        <p:spPr>
-          <a:xfrm>
-            <a:off x="1049413" y="1968687"/>
-            <a:ext cx="10721186" cy="2246769"/>
-          </a:xfrm>
-          <a:prstGeom prst="rect">
-            <a:avLst/>
-          </a:prstGeom>
-          <a:noFill/>
-        </p:spPr>
-        <p:txBody>
-          <a:bodyPr wrap="square" rtlCol="0">
-            <a:spAutoFit/>
-          </a:bodyPr>
-          <a:lstStyle/>
-          <a:p>
-            <a:r>
-              <a:rPr lang="en-US" altLang="zh-CN" sz="2000" b="1" dirty="0"/>
-              <a:t>The main problems are:</a:t>
-            </a:r>
-          </a:p>
-          <a:p>
-            <a:endParaRPr lang="en-US" altLang="zh-CN" sz="2000" b="1" dirty="0"/>
-          </a:p>
-          <a:p>
-            <a:pPr marL="285750" indent="-285750">
-              <a:buFont typeface="Arial" panose="020B0604020202020204" pitchFamily="34" charset="0"/>
-              <a:buChar char="•"/>
-            </a:pPr>
-            <a:r>
-              <a:rPr lang="en-US" altLang="zh-CN" sz="2000" b="1" dirty="0"/>
-              <a:t>Even kernel 8(</a:t>
-            </a:r>
-            <a:r>
-              <a:rPr lang="en-US" altLang="zh-CN" sz="2000" b="1" dirty="0" err="1"/>
-              <a:t>warp_tile</a:t>
-            </a:r>
-            <a:r>
-              <a:rPr lang="en-US" altLang="zh-CN" sz="2000" b="1" dirty="0"/>
-              <a:t>) solves the bank conflict and uncoalesced global store, the performance is worse than kernel 7.</a:t>
-            </a:r>
-          </a:p>
-          <a:p>
-            <a:pPr marL="285750" indent="-285750">
-              <a:buFont typeface="Arial" panose="020B0604020202020204" pitchFamily="34" charset="0"/>
-              <a:buChar char="•"/>
-            </a:pPr>
-            <a:endParaRPr lang="en-US" altLang="zh-CN" sz="2000" b="1" dirty="0"/>
-          </a:p>
-          <a:p>
-            <a:pPr marL="285750" indent="-285750">
-              <a:buFont typeface="Arial" panose="020B0604020202020204" pitchFamily="34" charset="0"/>
-              <a:buChar char="•"/>
-            </a:pPr>
-            <a:r>
-              <a:rPr lang="en-US" altLang="zh-CN" sz="2000" b="1" dirty="0"/>
-              <a:t>Kernel 9(double buffering) performs even worse than kernel 8, this is because of excessive register usage.</a:t>
-            </a:r>
-            <a:endParaRPr lang="zh-CN" altLang="en-US" sz="2000" b="1" dirty="0"/>
-          </a:p>
-        </p:txBody>
-      </p:sp>
+              <a:t>Optimization worklog and concept illustration</a:t>
+            </a:r>
+          </a:p>
+        </p:txBody>
+      </p:sp>
+      <p:pic>
+        <p:nvPicPr>
+          <p:cNvPr id="9" name="图片 8">
+            <a:extLst>
+              <a:ext uri="{FF2B5EF4-FFF2-40B4-BE49-F238E27FC236}">
+                <a16:creationId xmlns:a16="http://schemas.microsoft.com/office/drawing/2014/main" id="{0B12A95F-4BC2-1D51-439F-9252687C9111}"/>
+              </a:ext>
+            </a:extLst>
+          </p:cNvPr>
+          <p:cNvPicPr>
+            <a:picLocks noChangeAspect="1"/>
+          </p:cNvPicPr>
+          <p:nvPr/>
+        </p:nvPicPr>
+        <p:blipFill>
+          <a:blip r:embed="rId2"/>
+          <a:stretch>
+            <a:fillRect/>
+          </a:stretch>
+        </p:blipFill>
+        <p:spPr>
+          <a:xfrm>
+            <a:off x="2828571" y="1337509"/>
+            <a:ext cx="5982535" cy="4391638"/>
+          </a:xfrm>
+          <a:prstGeom prst="rect">
+            <a:avLst/>
+          </a:prstGeom>
+        </p:spPr>
+      </p:pic>
     </p:spTree>
     <p:extLst>
       <p:ext uri="{BB962C8B-B14F-4D97-AF65-F5344CB8AC3E}">
-        <p14:creationId xmlns:p14="http://schemas.microsoft.com/office/powerpoint/2010/main" val="174841328"/>
+        <p14:creationId xmlns:p14="http://schemas.microsoft.com/office/powerpoint/2010/main" val="1462063294"/>
       </p:ext>
     </p:extLst>
   </p:cSld>
@@ -10951,7 +11092,7 @@
           <p:cNvPr id="2" name="文本框 1">
             <a:extLst>
               <a:ext uri="{FF2B5EF4-FFF2-40B4-BE49-F238E27FC236}">
-                <a16:creationId xmlns:a16="http://schemas.microsoft.com/office/drawing/2014/main" id="{8B482538-5B95-07B6-157A-F7184D247C55}"/>
+                <a16:creationId xmlns:a16="http://schemas.microsoft.com/office/drawing/2014/main" id="{5C20ADEE-FF9D-CE49-8F9A-775C360AE867}"/>
               </a:ext>
             </a:extLst>
           </p:cNvPr>
@@ -11057,10 +11198,10 @@
       </p:sp>
       <p:sp>
         <p:nvSpPr>
-          <p:cNvPr id="3" name="文本框 2">
-            <a:extLst>
-              <a:ext uri="{FF2B5EF4-FFF2-40B4-BE49-F238E27FC236}">
-                <a16:creationId xmlns:a16="http://schemas.microsoft.com/office/drawing/2014/main" id="{183CADAA-2CB8-82D7-81AD-443DB1A196AE}"/>
+          <p:cNvPr id="6" name="文本框 5">
+            <a:extLst>
+              <a:ext uri="{FF2B5EF4-FFF2-40B4-BE49-F238E27FC236}">
+                <a16:creationId xmlns:a16="http://schemas.microsoft.com/office/drawing/2014/main" id="{45E110C7-0CC5-0F7A-776C-6C4A2921D05E}"/>
               </a:ext>
             </a:extLst>
           </p:cNvPr>
@@ -11069,8 +11210,8 @@
         </p:nvSpPr>
         <p:spPr>
           <a:xfrm>
-            <a:off x="1098506" y="1301026"/>
-            <a:ext cx="10211823" cy="4401205"/>
+            <a:off x="1049413" y="1968687"/>
+            <a:ext cx="10721186" cy="2246769"/>
           </a:xfrm>
           <a:prstGeom prst="rect">
             <a:avLst/>
@@ -11085,20 +11226,7 @@
           <a:p>
             <a:r>
               <a:rPr lang="en-US" altLang="zh-CN" sz="2000" b="1" dirty="0"/>
-              <a:t>TODO:</a:t>
-            </a:r>
-          </a:p>
-          <a:p>
-            <a:endParaRPr lang="en-US" altLang="zh-CN" sz="2000" b="1" dirty="0"/>
-          </a:p>
-          <a:p>
-            <a:pPr marL="342900" indent="-342900">
-              <a:buFont typeface="Arial" panose="020B0604020202020204" pitchFamily="34" charset="0"/>
-              <a:buChar char="•"/>
-            </a:pPr>
-            <a:r>
-              <a:rPr lang="en-US" altLang="zh-CN" sz="2000" b="1" dirty="0"/>
-              <a:t>Test more configurations.</a:t>
+              <a:t>The main problems are:</a:t>
             </a:r>
           </a:p>
           <a:p>
@@ -11110,12 +11238,16 @@
               <a:buChar char="•"/>
             </a:pPr>
             <a:r>
+              <a:rPr lang="en-US" altLang="zh-CN" sz="2000" b="1" dirty="0"/>
+              <a:t>Even kernel 8(</a:t>
+            </a:r>
+            <a:r>
               <a:rPr lang="en-US" altLang="zh-CN" sz="2000" b="1" dirty="0" err="1"/>
-              <a:t>asm</a:t>
+              <a:t>warp_tile</a:t>
             </a:r>
             <a:r>
               <a:rPr lang="en-US" altLang="zh-CN" sz="2000" b="1" dirty="0"/>
-              <a:t>() can be used to integrate PTX code into CUDA code, I wonder if it brings any performance improvement.</a:t>
+              <a:t>) solves the bank conflict and uncoalesced global store, the performance is worse than kernel 7.</a:t>
             </a:r>
           </a:p>
           <a:p>
@@ -11132,74 +11264,16 @@
             </a:pPr>
             <a:r>
               <a:rPr lang="en-US" altLang="zh-CN" sz="2000" b="1" dirty="0"/>
-              <a:t>For now, my kernels only deal with perfect square matrix with no tile quantization.</a:t>
-            </a:r>
-          </a:p>
-          <a:p>
-            <a:pPr marL="285750" indent="-285750">
-              <a:buFont typeface="Arial" panose="020B0604020202020204" pitchFamily="34" charset="0"/>
-              <a:buChar char="•"/>
-            </a:pPr>
-            <a:endParaRPr lang="en-US" altLang="zh-CN" sz="2000" b="1" dirty="0"/>
-          </a:p>
-          <a:p>
-            <a:pPr marL="285750" indent="-285750">
-              <a:buFont typeface="Arial" panose="020B0604020202020204" pitchFamily="34" charset="0"/>
-              <a:buChar char="•"/>
-            </a:pPr>
-            <a:r>
-              <a:rPr lang="en-US" altLang="zh-CN" sz="2000" b="1" dirty="0" err="1"/>
-              <a:t>Sgemm</a:t>
-            </a:r>
-            <a:r>
-              <a:rPr lang="en-US" altLang="zh-CN" sz="2000" b="1" dirty="0"/>
-              <a:t> can’t use tensor core, bf16 format is useful in mixed precision training.</a:t>
-            </a:r>
-          </a:p>
-          <a:p>
-            <a:pPr marL="285750" indent="-285750">
-              <a:buFont typeface="Arial" panose="020B0604020202020204" pitchFamily="34" charset="0"/>
-              <a:buChar char="•"/>
-            </a:pPr>
-            <a:endParaRPr lang="en-US" altLang="zh-CN" sz="2000" b="1" dirty="0"/>
-          </a:p>
-          <a:p>
-            <a:pPr marL="285750" indent="-285750">
-              <a:buFont typeface="Arial" panose="020B0604020202020204" pitchFamily="34" charset="0"/>
-              <a:buChar char="•"/>
-            </a:pPr>
-            <a:r>
-              <a:rPr lang="en-US" altLang="zh-CN" sz="2000" b="1" dirty="0"/>
-              <a:t>Hopper GPU has some new features: TMA,   asynchronous barrier.</a:t>
-            </a:r>
-          </a:p>
-          <a:p>
-            <a:pPr marL="285750" indent="-285750">
-              <a:buFont typeface="Arial" panose="020B0604020202020204" pitchFamily="34" charset="0"/>
-              <a:buChar char="•"/>
-            </a:pPr>
-            <a:endParaRPr lang="en-US" altLang="zh-CN" sz="2000" b="1" dirty="0"/>
-          </a:p>
-          <a:p>
-            <a:pPr marL="285750" indent="-285750">
-              <a:buFont typeface="Arial" panose="020B0604020202020204" pitchFamily="34" charset="0"/>
-              <a:buChar char="•"/>
-            </a:pPr>
-            <a:r>
-              <a:rPr lang="en-US" altLang="zh-CN" sz="2000" b="1" dirty="0"/>
-              <a:t>Maybe I will digger deeper into CUTLASS</a:t>
-            </a:r>
-            <a:r>
-              <a:rPr lang="en-US" altLang="zh-CN" dirty="0"/>
-              <a:t>.</a:t>
-            </a:r>
+              <a:t>Kernel 9(double buffering) performs even worse than kernel 8, this is because of excessive register usage.</a:t>
+            </a:r>
+            <a:endParaRPr lang="zh-CN" altLang="en-US" sz="2000" b="1" dirty="0"/>
           </a:p>
         </p:txBody>
       </p:sp>
     </p:spTree>
     <p:extLst>
       <p:ext uri="{BB962C8B-B14F-4D97-AF65-F5344CB8AC3E}">
-        <p14:creationId xmlns:p14="http://schemas.microsoft.com/office/powerpoint/2010/main" val="2993609768"/>
+        <p14:creationId xmlns:p14="http://schemas.microsoft.com/office/powerpoint/2010/main" val="174841328"/>
       </p:ext>
     </p:extLst>
   </p:cSld>
@@ -11231,7 +11305,7 @@
           <p:cNvPr id="2" name="文本框 1">
             <a:extLst>
               <a:ext uri="{FF2B5EF4-FFF2-40B4-BE49-F238E27FC236}">
-                <a16:creationId xmlns:a16="http://schemas.microsoft.com/office/drawing/2014/main" id="{CA1E45E4-081D-9956-7EEF-11B283FB313F}"/>
+                <a16:creationId xmlns:a16="http://schemas.microsoft.com/office/drawing/2014/main" id="{8B482538-5B95-07B6-157A-F7184D247C55}"/>
               </a:ext>
             </a:extLst>
           </p:cNvPr>
@@ -11240,8 +11314,8 @@
         </p:nvSpPr>
         <p:spPr>
           <a:xfrm>
-            <a:off x="593746" y="431769"/>
-            <a:ext cx="1400751" cy="584775"/>
+            <a:off x="335996" y="127758"/>
+            <a:ext cx="4389427" cy="584775"/>
           </a:xfrm>
           <a:prstGeom prst="rect">
             <a:avLst/>
@@ -11275,7 +11349,10 @@
                   <a:noFill/>
                 </a:ln>
                 <a:solidFill>
-                  <a:srgbClr val="CF90E8"/>
+                  <a:srgbClr val="ED7D31">
+                    <a:lumMod val="60000"/>
+                    <a:lumOff val="40000"/>
+                  </a:srgbClr>
                 </a:solidFill>
                 <a:effectLst/>
                 <a:uLnTx/>
@@ -11284,8 +11361,51 @@
                 <a:ea typeface="等线" panose="02010600030101010101" pitchFamily="2" charset="-122"/>
                 <a:cs typeface="+mn-cs"/>
               </a:rPr>
-              <a:t>Bonus</a:t>
-            </a:r>
+              <a:t>Confusion and</a:t>
+            </a:r>
+            <a:r>
+              <a:rPr lang="zh-CN" altLang="en-US" sz="3200" b="1" dirty="0">
+                <a:solidFill>
+                  <a:srgbClr val="ED7D31">
+                    <a:lumMod val="60000"/>
+                    <a:lumOff val="40000"/>
+                  </a:srgbClr>
+                </a:solidFill>
+                <a:latin typeface="等线" panose="020F0502020204030204"/>
+                <a:ea typeface="等线" panose="02010600030101010101" pitchFamily="2" charset="-122"/>
+              </a:rPr>
+              <a:t> </a:t>
+            </a:r>
+            <a:r>
+              <a:rPr lang="en-US" altLang="zh-CN" sz="3200" b="1" dirty="0">
+                <a:solidFill>
+                  <a:srgbClr val="ED7D31">
+                    <a:lumMod val="60000"/>
+                    <a:lumOff val="40000"/>
+                  </a:srgbClr>
+                </a:solidFill>
+                <a:latin typeface="等线" panose="020F0502020204030204"/>
+                <a:ea typeface="等线" panose="02010600030101010101" pitchFamily="2" charset="-122"/>
+              </a:rPr>
+              <a:t>TODO</a:t>
+            </a:r>
+            <a:endParaRPr kumimoji="0" lang="en-US" altLang="zh-CN" sz="3200" b="1" i="0" u="none" strike="noStrike" kern="1200" cap="none" spc="0" normalizeH="0" baseline="0" noProof="0" dirty="0">
+              <a:ln>
+                <a:noFill/>
+              </a:ln>
+              <a:solidFill>
+                <a:srgbClr val="ED7D31">
+                  <a:lumMod val="60000"/>
+                  <a:lumOff val="40000"/>
+                </a:srgbClr>
+              </a:solidFill>
+              <a:effectLst/>
+              <a:uLnTx/>
+              <a:uFillTx/>
+              <a:latin typeface="等线" panose="020F0502020204030204"/>
+              <a:ea typeface="等线" panose="02010600030101010101" pitchFamily="2" charset="-122"/>
+              <a:cs typeface="+mn-cs"/>
+            </a:endParaRPr>
           </a:p>
         </p:txBody>
       </p:sp>
@@ -11294,7 +11414,7 @@
           <p:cNvPr id="3" name="文本框 2">
             <a:extLst>
               <a:ext uri="{FF2B5EF4-FFF2-40B4-BE49-F238E27FC236}">
-                <a16:creationId xmlns:a16="http://schemas.microsoft.com/office/drawing/2014/main" id="{8227A2D7-0B01-4129-4E1F-1C5C25F6BB83}"/>
+                <a16:creationId xmlns:a16="http://schemas.microsoft.com/office/drawing/2014/main" id="{183CADAA-2CB8-82D7-81AD-443DB1A196AE}"/>
               </a:ext>
             </a:extLst>
           </p:cNvPr>
@@ -11303,8 +11423,8 @@
         </p:nvSpPr>
         <p:spPr>
           <a:xfrm>
-            <a:off x="644376" y="2129508"/>
-            <a:ext cx="6511264" cy="954107"/>
+            <a:off x="1098506" y="1301026"/>
+            <a:ext cx="10211823" cy="4401205"/>
           </a:xfrm>
           <a:prstGeom prst="rect">
             <a:avLst/>
@@ -11316,33 +11436,124 @@
             <a:spAutoFit/>
           </a:bodyPr>
           <a:lstStyle/>
+          <a:p>
+            <a:r>
+              <a:rPr lang="en-US" altLang="zh-CN" sz="2000" b="1" dirty="0"/>
+              <a:t>TODO:</a:t>
+            </a:r>
+          </a:p>
+          <a:p>
+            <a:endParaRPr lang="en-US" altLang="zh-CN" sz="2000" b="1" dirty="0"/>
+          </a:p>
+          <a:p>
+            <a:pPr marL="342900" indent="-342900">
+              <a:buFont typeface="Arial" panose="020B0604020202020204" pitchFamily="34" charset="0"/>
+              <a:buChar char="•"/>
+            </a:pPr>
+            <a:r>
+              <a:rPr lang="en-US" altLang="zh-CN" sz="2000" b="1" dirty="0"/>
+              <a:t>Test more configurations.</a:t>
+            </a:r>
+          </a:p>
+          <a:p>
+            <a:endParaRPr lang="en-US" altLang="zh-CN" sz="2000" b="1" dirty="0"/>
+          </a:p>
           <a:p>
             <a:pPr marL="285750" indent="-285750">
               <a:buFont typeface="Arial" panose="020B0604020202020204" pitchFamily="34" charset="0"/>
               <a:buChar char="•"/>
             </a:pPr>
             <a:r>
-              <a:rPr lang="en-US" altLang="zh-CN" sz="2800" b="1" dirty="0"/>
-              <a:t>How </a:t>
-            </a:r>
-            <a:r>
-              <a:rPr lang="en-US" altLang="zh-CN" sz="2800" b="1" dirty="0" err="1"/>
-              <a:t>ncu</a:t>
-            </a:r>
-            <a:r>
-              <a:rPr lang="en-US" altLang="zh-CN" sz="2800" b="1" dirty="0"/>
-              <a:t> profiler works</a:t>
-            </a:r>
-          </a:p>
-          <a:p>
-            <a:endParaRPr lang="en-US" altLang="zh-CN" sz="2800" b="1" dirty="0"/>
+              <a:rPr lang="en-US" altLang="zh-CN" sz="2000" b="1" dirty="0" err="1"/>
+              <a:t>asm</a:t>
+            </a:r>
+            <a:r>
+              <a:rPr lang="en-US" altLang="zh-CN" sz="2000" b="1" dirty="0"/>
+              <a:t>() can be used to integrate PTX code into CUDA code, I wonder if it brings any performance improvement.</a:t>
+            </a:r>
+          </a:p>
+          <a:p>
+            <a:pPr marL="285750" indent="-285750">
+              <a:buFont typeface="Arial" panose="020B0604020202020204" pitchFamily="34" charset="0"/>
+              <a:buChar char="•"/>
+            </a:pPr>
+            <a:endParaRPr lang="en-US" altLang="zh-CN" sz="2000" b="1" dirty="0"/>
+          </a:p>
+          <a:p>
+            <a:pPr marL="285750" indent="-285750">
+              <a:buFont typeface="Arial" panose="020B0604020202020204" pitchFamily="34" charset="0"/>
+              <a:buChar char="•"/>
+            </a:pPr>
+            <a:r>
+              <a:rPr lang="en-US" altLang="zh-CN" sz="2000" b="1" dirty="0"/>
+              <a:t>For now, my kernels only deal with perfect square matrix with no tile quantization.</a:t>
+            </a:r>
+          </a:p>
+          <a:p>
+            <a:pPr marL="285750" indent="-285750">
+              <a:buFont typeface="Arial" panose="020B0604020202020204" pitchFamily="34" charset="0"/>
+              <a:buChar char="•"/>
+            </a:pPr>
+            <a:endParaRPr lang="en-US" altLang="zh-CN" sz="2000" b="1" dirty="0"/>
+          </a:p>
+          <a:p>
+            <a:pPr marL="285750" indent="-285750">
+              <a:buFont typeface="Arial" panose="020B0604020202020204" pitchFamily="34" charset="0"/>
+              <a:buChar char="•"/>
+            </a:pPr>
+            <a:r>
+              <a:rPr lang="en-US" altLang="zh-CN" sz="2000" b="1" dirty="0" err="1"/>
+              <a:t>Sgemm</a:t>
+            </a:r>
+            <a:r>
+              <a:rPr lang="en-US" altLang="zh-CN" sz="2000" b="1" dirty="0"/>
+              <a:t> can’t use tensor core, bf16 format is useful in mixed precision training.</a:t>
+            </a:r>
+          </a:p>
+          <a:p>
+            <a:pPr marL="285750" indent="-285750">
+              <a:buFont typeface="Arial" panose="020B0604020202020204" pitchFamily="34" charset="0"/>
+              <a:buChar char="•"/>
+            </a:pPr>
+            <a:endParaRPr lang="en-US" altLang="zh-CN" sz="2000" b="1" dirty="0"/>
+          </a:p>
+          <a:p>
+            <a:pPr marL="285750" indent="-285750">
+              <a:buFont typeface="Arial" panose="020B0604020202020204" pitchFamily="34" charset="0"/>
+              <a:buChar char="•"/>
+            </a:pPr>
+            <a:r>
+              <a:rPr lang="en-US" altLang="zh-CN" sz="2000" b="1" dirty="0"/>
+              <a:t>Hopper GPU has some new features: TMA,   asynchronous barrier.</a:t>
+            </a:r>
+          </a:p>
+          <a:p>
+            <a:pPr marL="285750" indent="-285750">
+              <a:buFont typeface="Arial" panose="020B0604020202020204" pitchFamily="34" charset="0"/>
+              <a:buChar char="•"/>
+            </a:pPr>
+            <a:endParaRPr lang="en-US" altLang="zh-CN" sz="2000" b="1" dirty="0"/>
+          </a:p>
+          <a:p>
+            <a:pPr marL="285750" indent="-285750">
+              <a:buFont typeface="Arial" panose="020B0604020202020204" pitchFamily="34" charset="0"/>
+              <a:buChar char="•"/>
+            </a:pPr>
+            <a:r>
+              <a:rPr lang="en-US" altLang="zh-CN" sz="2000" b="1" dirty="0"/>
+              <a:t>Maybe I will digger deeper into CUTLASS</a:t>
+            </a:r>
+            <a:r>
+              <a:rPr lang="en-US" altLang="zh-CN" dirty="0"/>
+              <a:t>.</a:t>
+            </a:r>
           </a:p>
         </p:txBody>
       </p:sp>
     </p:spTree>
     <p:extLst>
       <p:ext uri="{BB962C8B-B14F-4D97-AF65-F5344CB8AC3E}">
-        <p14:creationId xmlns:p14="http://schemas.microsoft.com/office/powerpoint/2010/main" val="1266940628"/>
+        <p14:creationId xmlns:p14="http://schemas.microsoft.com/office/powerpoint/2010/main" val="2993609768"/>
       </p:ext>
     </p:extLst>
   </p:cSld>
@@ -11374,7 +11585,7 @@
           <p:cNvPr id="2" name="文本框 1">
             <a:extLst>
               <a:ext uri="{FF2B5EF4-FFF2-40B4-BE49-F238E27FC236}">
-                <a16:creationId xmlns:a16="http://schemas.microsoft.com/office/drawing/2014/main" id="{405F664B-8971-3F96-7160-B7E54F28CE3A}"/>
+                <a16:creationId xmlns:a16="http://schemas.microsoft.com/office/drawing/2014/main" id="{CA1E45E4-081D-9956-7EEF-11B283FB313F}"/>
               </a:ext>
             </a:extLst>
           </p:cNvPr>
@@ -11432,40 +11643,60 @@
           </a:p>
         </p:txBody>
       </p:sp>
-      <p:pic>
-        <p:nvPicPr>
-          <p:cNvPr id="12" name="图片 11">
-            <a:extLst>
-              <a:ext uri="{FF2B5EF4-FFF2-40B4-BE49-F238E27FC236}">
-                <a16:creationId xmlns:a16="http://schemas.microsoft.com/office/drawing/2014/main" id="{30FAECB4-09D6-1D02-3F23-E303D21C76D8}"/>
-              </a:ext>
-            </a:extLst>
-          </p:cNvPr>
-          <p:cNvPicPr>
-            <a:picLocks noChangeAspect="1"/>
-          </p:cNvPicPr>
-          <p:nvPr/>
-        </p:nvPicPr>
-        <p:blipFill>
-          <a:blip r:embed="rId2"/>
-          <a:stretch>
-            <a:fillRect/>
-          </a:stretch>
-        </p:blipFill>
-        <p:spPr>
-          <a:xfrm>
-            <a:off x="2630534" y="500205"/>
-            <a:ext cx="6820312" cy="6022734"/>
-          </a:xfrm>
-          <a:prstGeom prst="rect">
-            <a:avLst/>
-          </a:prstGeom>
-        </p:spPr>
-      </p:pic>
+      <p:sp>
+        <p:nvSpPr>
+          <p:cNvPr id="3" name="文本框 2">
+            <a:extLst>
+              <a:ext uri="{FF2B5EF4-FFF2-40B4-BE49-F238E27FC236}">
+                <a16:creationId xmlns:a16="http://schemas.microsoft.com/office/drawing/2014/main" id="{8227A2D7-0B01-4129-4E1F-1C5C25F6BB83}"/>
+              </a:ext>
+            </a:extLst>
+          </p:cNvPr>
+          <p:cNvSpPr txBox="1"/>
+          <p:nvPr/>
+        </p:nvSpPr>
+        <p:spPr>
+          <a:xfrm>
+            <a:off x="644376" y="2129508"/>
+            <a:ext cx="6511264" cy="954107"/>
+          </a:xfrm>
+          <a:prstGeom prst="rect">
+            <a:avLst/>
+          </a:prstGeom>
+          <a:noFill/>
+        </p:spPr>
+        <p:txBody>
+          <a:bodyPr wrap="square" rtlCol="0">
+            <a:spAutoFit/>
+          </a:bodyPr>
+          <a:lstStyle/>
+          <a:p>
+            <a:pPr marL="285750" indent="-285750">
+              <a:buFont typeface="Arial" panose="020B0604020202020204" pitchFamily="34" charset="0"/>
+              <a:buChar char="•"/>
+            </a:pPr>
+            <a:r>
+              <a:rPr lang="en-US" altLang="zh-CN" sz="2800" b="1" dirty="0"/>
+              <a:t>How </a:t>
+            </a:r>
+            <a:r>
+              <a:rPr lang="en-US" altLang="zh-CN" sz="2800" b="1" dirty="0" err="1"/>
+              <a:t>ncu</a:t>
+            </a:r>
+            <a:r>
+              <a:rPr lang="en-US" altLang="zh-CN" sz="2800" b="1" dirty="0"/>
+              <a:t> profiler works</a:t>
+            </a:r>
+          </a:p>
+          <a:p>
+            <a:endParaRPr lang="en-US" altLang="zh-CN" sz="2800" b="1" dirty="0"/>
+          </a:p>
+        </p:txBody>
+      </p:sp>
     </p:spTree>
     <p:extLst>
       <p:ext uri="{BB962C8B-B14F-4D97-AF65-F5344CB8AC3E}">
-        <p14:creationId xmlns:p14="http://schemas.microsoft.com/office/powerpoint/2010/main" val="262606484"/>
+        <p14:creationId xmlns:p14="http://schemas.microsoft.com/office/powerpoint/2010/main" val="1266940628"/>
       </p:ext>
     </p:extLst>
   </p:cSld>
@@ -11494,70 +11725,10 @@
       </p:grpSpPr>
       <p:sp>
         <p:nvSpPr>
-          <p:cNvPr id="3" name="文本框 2">
-            <a:extLst>
-              <a:ext uri="{FF2B5EF4-FFF2-40B4-BE49-F238E27FC236}">
-                <a16:creationId xmlns:a16="http://schemas.microsoft.com/office/drawing/2014/main" id="{C4259EF7-E784-32D2-DF07-A001183B8394}"/>
-              </a:ext>
-            </a:extLst>
-          </p:cNvPr>
-          <p:cNvSpPr txBox="1"/>
-          <p:nvPr/>
-        </p:nvSpPr>
-        <p:spPr>
-          <a:xfrm>
-            <a:off x="1080097" y="1448311"/>
-            <a:ext cx="9794513" cy="1323439"/>
-          </a:xfrm>
-          <a:prstGeom prst="rect">
-            <a:avLst/>
-          </a:prstGeom>
-          <a:noFill/>
-        </p:spPr>
-        <p:txBody>
-          <a:bodyPr wrap="square" rtlCol="0">
-            <a:spAutoFit/>
-          </a:bodyPr>
-          <a:lstStyle/>
-          <a:p>
-            <a:r>
-              <a:rPr lang="en-US" altLang="zh-CN" sz="2000" b="1" dirty="0"/>
-              <a:t>If collecting many metrics using </a:t>
-            </a:r>
-            <a:r>
-              <a:rPr lang="en-US" altLang="zh-CN" sz="2000" b="1" dirty="0" err="1"/>
-              <a:t>ncu</a:t>
-            </a:r>
-            <a:r>
-              <a:rPr lang="en-US" altLang="zh-CN" sz="2000" b="1" dirty="0"/>
-              <a:t>, one profile pass may not be enough because the profiling itself consumes </a:t>
-            </a:r>
-            <a:r>
-              <a:rPr lang="en-US" altLang="zh-CN" sz="2000" b="1" dirty="0" err="1"/>
-              <a:t>gpu</a:t>
-            </a:r>
-            <a:r>
-              <a:rPr lang="en-US" altLang="zh-CN" sz="2000" b="1" dirty="0"/>
-              <a:t> resources. To not have a negative impact on the kernel, typically multiple passes are needed to collect all the information. When replaying the kernel, </a:t>
-            </a:r>
-            <a:r>
-              <a:rPr lang="en-US" altLang="zh-CN" sz="2000" b="1" dirty="0" err="1"/>
-              <a:t>ncu</a:t>
-            </a:r>
-            <a:r>
-              <a:rPr lang="en-US" altLang="zh-CN" sz="2000" b="1" dirty="0"/>
-              <a:t> does the below:</a:t>
-            </a:r>
-            <a:endParaRPr lang="zh-CN" altLang="en-US" sz="2000" b="1" dirty="0"/>
-          </a:p>
-        </p:txBody>
-      </p:sp>
-      <p:sp>
-        <p:nvSpPr>
-          <p:cNvPr id="4" name="文本框 3">
-            <a:extLst>
-              <a:ext uri="{FF2B5EF4-FFF2-40B4-BE49-F238E27FC236}">
-                <a16:creationId xmlns:a16="http://schemas.microsoft.com/office/drawing/2014/main" id="{7CFD213A-2520-54B0-E74A-7D9511759731}"/>
+          <p:cNvPr id="2" name="文本框 1">
+            <a:extLst>
+              <a:ext uri="{FF2B5EF4-FFF2-40B4-BE49-F238E27FC236}">
+                <a16:creationId xmlns:a16="http://schemas.microsoft.com/office/drawing/2014/main" id="{405F664B-8971-3F96-7160-B7E54F28CE3A}"/>
               </a:ext>
             </a:extLst>
           </p:cNvPr>
@@ -11617,10 +11788,10 @@
       </p:sp>
       <p:pic>
         <p:nvPicPr>
-          <p:cNvPr id="6" name="图片 5">
-            <a:extLst>
-              <a:ext uri="{FF2B5EF4-FFF2-40B4-BE49-F238E27FC236}">
-                <a16:creationId xmlns:a16="http://schemas.microsoft.com/office/drawing/2014/main" id="{4A96677C-D0CB-BFDA-F5B3-8A163AF5AD9F}"/>
+          <p:cNvPr id="12" name="图片 11">
+            <a:extLst>
+              <a:ext uri="{FF2B5EF4-FFF2-40B4-BE49-F238E27FC236}">
+                <a16:creationId xmlns:a16="http://schemas.microsoft.com/office/drawing/2014/main" id="{30FAECB4-09D6-1D02-3F23-E303D21C76D8}"/>
               </a:ext>
             </a:extLst>
           </p:cNvPr>
@@ -11637,8 +11808,8 @@
         </p:blipFill>
         <p:spPr>
           <a:xfrm>
-            <a:off x="1243746" y="3087719"/>
-            <a:ext cx="9794514" cy="3146557"/>
+            <a:off x="2630534" y="500205"/>
+            <a:ext cx="6820312" cy="6022734"/>
           </a:xfrm>
           <a:prstGeom prst="rect">
             <a:avLst/>
@@ -11648,7 +11819,7 @@
     </p:spTree>
     <p:extLst>
       <p:ext uri="{BB962C8B-B14F-4D97-AF65-F5344CB8AC3E}">
-        <p14:creationId xmlns:p14="http://schemas.microsoft.com/office/powerpoint/2010/main" val="334617678"/>
+        <p14:creationId xmlns:p14="http://schemas.microsoft.com/office/powerpoint/2010/main" val="262606484"/>
       </p:ext>
     </p:extLst>
   </p:cSld>
@@ -11677,10 +11848,10 @@
       </p:grpSpPr>
       <p:sp>
         <p:nvSpPr>
-          <p:cNvPr id="2" name="文本框 1">
-            <a:extLst>
-              <a:ext uri="{FF2B5EF4-FFF2-40B4-BE49-F238E27FC236}">
-                <a16:creationId xmlns:a16="http://schemas.microsoft.com/office/drawing/2014/main" id="{3FEE3E1B-80C7-F3C7-FBD1-C7452742888A}"/>
+          <p:cNvPr id="3" name="文本框 2">
+            <a:extLst>
+              <a:ext uri="{FF2B5EF4-FFF2-40B4-BE49-F238E27FC236}">
+                <a16:creationId xmlns:a16="http://schemas.microsoft.com/office/drawing/2014/main" id="{C4259EF7-E784-32D2-DF07-A001183B8394}"/>
               </a:ext>
             </a:extLst>
           </p:cNvPr>
@@ -11689,8 +11860,8 @@
         </p:nvSpPr>
         <p:spPr>
           <a:xfrm>
-            <a:off x="3583958" y="2761611"/>
-            <a:ext cx="4854298" cy="584775"/>
+            <a:off x="1080097" y="1448311"/>
+            <a:ext cx="9794513" cy="1323439"/>
           </a:xfrm>
           <a:prstGeom prst="rect">
             <a:avLst/>
@@ -11704,17 +11875,134 @@
           <a:lstStyle/>
           <a:p>
             <a:r>
-              <a:rPr lang="en-US" altLang="zh-CN" sz="3200" b="1" dirty="0"/>
-              <a:t>Thank you for your time.</a:t>
-            </a:r>
-            <a:endParaRPr lang="zh-CN" altLang="en-US" sz="3200" b="1" dirty="0"/>
-          </a:p>
-        </p:txBody>
-      </p:sp>
+              <a:rPr lang="en-US" altLang="zh-CN" sz="2000" b="1" dirty="0"/>
+              <a:t>If collecting many metrics using </a:t>
+            </a:r>
+            <a:r>
+              <a:rPr lang="en-US" altLang="zh-CN" sz="2000" b="1" dirty="0" err="1"/>
+              <a:t>ncu</a:t>
+            </a:r>
+            <a:r>
+              <a:rPr lang="en-US" altLang="zh-CN" sz="2000" b="1" dirty="0"/>
+              <a:t>, one profile pass may not be enough because the profiling itself consumes </a:t>
+            </a:r>
+            <a:r>
+              <a:rPr lang="en-US" altLang="zh-CN" sz="2000" b="1" dirty="0" err="1"/>
+              <a:t>gpu</a:t>
+            </a:r>
+            <a:r>
+              <a:rPr lang="en-US" altLang="zh-CN" sz="2000" b="1" dirty="0"/>
+              <a:t> resources. To not have a negative impact on the kernel, typically multiple passes are needed to collect all the information. When replaying the kernel, </a:t>
+            </a:r>
+            <a:r>
+              <a:rPr lang="en-US" altLang="zh-CN" sz="2000" b="1" dirty="0" err="1"/>
+              <a:t>ncu</a:t>
+            </a:r>
+            <a:r>
+              <a:rPr lang="en-US" altLang="zh-CN" sz="2000" b="1" dirty="0"/>
+              <a:t> does the below:</a:t>
+            </a:r>
+            <a:endParaRPr lang="zh-CN" altLang="en-US" sz="2000" b="1" dirty="0"/>
+          </a:p>
+        </p:txBody>
+      </p:sp>
+      <p:sp>
+        <p:nvSpPr>
+          <p:cNvPr id="4" name="文本框 3">
+            <a:extLst>
+              <a:ext uri="{FF2B5EF4-FFF2-40B4-BE49-F238E27FC236}">
+                <a16:creationId xmlns:a16="http://schemas.microsoft.com/office/drawing/2014/main" id="{7CFD213A-2520-54B0-E74A-7D9511759731}"/>
+              </a:ext>
+            </a:extLst>
+          </p:cNvPr>
+          <p:cNvSpPr txBox="1"/>
+          <p:nvPr/>
+        </p:nvSpPr>
+        <p:spPr>
+          <a:xfrm>
+            <a:off x="593746" y="431769"/>
+            <a:ext cx="1400751" cy="584775"/>
+          </a:xfrm>
+          <a:prstGeom prst="rect">
+            <a:avLst/>
+          </a:prstGeom>
+          <a:noFill/>
+        </p:spPr>
+        <p:txBody>
+          <a:bodyPr wrap="square">
+            <a:spAutoFit/>
+          </a:bodyPr>
+          <a:lstStyle/>
+          <a:p>
+            <a:pPr marR="0" lvl="0" algn="l" defTabSz="914400" rtl="0" eaLnBrk="1" fontAlgn="auto" latinLnBrk="0" hangingPunct="1">
+              <a:lnSpc>
+                <a:spcPct val="100000"/>
+              </a:lnSpc>
+              <a:spcBef>
+                <a:spcPts val="0"/>
+              </a:spcBef>
+              <a:spcAft>
+                <a:spcPts val="0"/>
+              </a:spcAft>
+              <a:buClrTx/>
+              <a:buSzTx/>
+              <a:tabLst/>
+              <a:defRPr/>
+            </a:pPr>
+            <a:r>
+              <a:rPr kumimoji="0" lang="en-US" altLang="zh-CN" sz="3200" b="1" i="0" u="none" strike="noStrike" kern="1200" cap="none" spc="0" normalizeH="0" baseline="0" noProof="0" dirty="0">
+                <a:ln>
+                  <a:noFill/>
+                </a:ln>
+                <a:solidFill>
+                  <a:srgbClr val="CF90E8"/>
+                </a:solidFill>
+                <a:effectLst/>
+                <a:uLnTx/>
+                <a:uFillTx/>
+                <a:latin typeface="等线" panose="020F0502020204030204"/>
+                <a:ea typeface="等线" panose="02010600030101010101" pitchFamily="2" charset="-122"/>
+                <a:cs typeface="+mn-cs"/>
+              </a:rPr>
+              <a:t>Bonus</a:t>
+            </a:r>
+          </a:p>
+        </p:txBody>
+      </p:sp>
+      <p:pic>
+        <p:nvPicPr>
+          <p:cNvPr id="6" name="图片 5">
+            <a:extLst>
+              <a:ext uri="{FF2B5EF4-FFF2-40B4-BE49-F238E27FC236}">
+                <a16:creationId xmlns:a16="http://schemas.microsoft.com/office/drawing/2014/main" id="{4A96677C-D0CB-BFDA-F5B3-8A163AF5AD9F}"/>
+              </a:ext>
+            </a:extLst>
+          </p:cNvPr>
+          <p:cNvPicPr>
+            <a:picLocks noChangeAspect="1"/>
+          </p:cNvPicPr>
+          <p:nvPr/>
+        </p:nvPicPr>
+        <p:blipFill>
+          <a:blip r:embed="rId2"/>
+          <a:stretch>
+            <a:fillRect/>
+          </a:stretch>
+        </p:blipFill>
+        <p:spPr>
+          <a:xfrm>
+            <a:off x="1243746" y="3087719"/>
+            <a:ext cx="9794514" cy="3146557"/>
+          </a:xfrm>
+          <a:prstGeom prst="rect">
+            <a:avLst/>
+          </a:prstGeom>
+        </p:spPr>
+      </p:pic>
     </p:spTree>
     <p:extLst>
       <p:ext uri="{BB962C8B-B14F-4D97-AF65-F5344CB8AC3E}">
-        <p14:creationId xmlns:p14="http://schemas.microsoft.com/office/powerpoint/2010/main" val="164160954"/>
+        <p14:creationId xmlns:p14="http://schemas.microsoft.com/office/powerpoint/2010/main" val="334617678"/>
       </p:ext>
     </p:extLst>
   </p:cSld>
@@ -11868,6 +12156,72 @@
     <p:extLst>
       <p:ext uri="{BB962C8B-B14F-4D97-AF65-F5344CB8AC3E}">
         <p14:creationId xmlns:p14="http://schemas.microsoft.com/office/powerpoint/2010/main" val="2802148515"/>
+      </p:ext>
+    </p:extLst>
+  </p:cSld>
+  <p:clrMapOvr>
+    <a:masterClrMapping/>
+  </p:clrMapOvr>
+</p:sld>
+</file>
+
+<file path=ppt/slides/slide50.xml><?xml version="1.0" encoding="utf-8"?>
+<p:sld xmlns:a="http://schemas.openxmlformats.org/drawingml/2006/main" xmlns:r="http://schemas.openxmlformats.org/officeDocument/2006/relationships" xmlns:p="http://schemas.openxmlformats.org/presentationml/2006/main">
+  <p:cSld>
+    <p:spTree>
+      <p:nvGrpSpPr>
+        <p:cNvPr id="1" name=""/>
+        <p:cNvGrpSpPr/>
+        <p:nvPr/>
+      </p:nvGrpSpPr>
+      <p:grpSpPr>
+        <a:xfrm>
+          <a:off x="0" y="0"/>
+          <a:ext cx="0" cy="0"/>
+          <a:chOff x="0" y="0"/>
+          <a:chExt cx="0" cy="0"/>
+        </a:xfrm>
+      </p:grpSpPr>
+      <p:sp>
+        <p:nvSpPr>
+          <p:cNvPr id="2" name="文本框 1">
+            <a:extLst>
+              <a:ext uri="{FF2B5EF4-FFF2-40B4-BE49-F238E27FC236}">
+                <a16:creationId xmlns:a16="http://schemas.microsoft.com/office/drawing/2014/main" id="{3FEE3E1B-80C7-F3C7-FBD1-C7452742888A}"/>
+              </a:ext>
+            </a:extLst>
+          </p:cNvPr>
+          <p:cNvSpPr txBox="1"/>
+          <p:nvPr/>
+        </p:nvSpPr>
+        <p:spPr>
+          <a:xfrm>
+            <a:off x="3583958" y="2761611"/>
+            <a:ext cx="4854298" cy="584775"/>
+          </a:xfrm>
+          <a:prstGeom prst="rect">
+            <a:avLst/>
+          </a:prstGeom>
+          <a:noFill/>
+        </p:spPr>
+        <p:txBody>
+          <a:bodyPr wrap="square" rtlCol="0">
+            <a:spAutoFit/>
+          </a:bodyPr>
+          <a:lstStyle/>
+          <a:p>
+            <a:r>
+              <a:rPr lang="en-US" altLang="zh-CN" sz="3200" b="1" dirty="0"/>
+              <a:t>Thank you for your time.</a:t>
+            </a:r>
+            <a:endParaRPr lang="zh-CN" altLang="en-US" sz="3200" b="1" dirty="0"/>
+          </a:p>
+        </p:txBody>
+      </p:sp>
+    </p:spTree>
+    <p:extLst>
+      <p:ext uri="{BB962C8B-B14F-4D97-AF65-F5344CB8AC3E}">
+        <p14:creationId xmlns:p14="http://schemas.microsoft.com/office/powerpoint/2010/main" val="164160954"/>
       </p:ext>
     </p:extLst>
   </p:cSld>

</xml_diff>